<commit_message>
Final lab review updates
</commit_message>
<xml_diff>
--- a/Hands-on lab/Resources/Lab Architecture.pptx
+++ b/Hands-on lab/Resources/Lab Architecture.pptx
@@ -5,10 +5,11 @@
     <p:sldMasterId id="2147483648" r:id="rId1"/>
   </p:sldMasterIdLst>
   <p:notesMasterIdLst>
-    <p:notesMasterId r:id="rId3"/>
+    <p:notesMasterId r:id="rId4"/>
   </p:notesMasterIdLst>
   <p:sldIdLst>
     <p:sldId id="8361" r:id="rId2"/>
+    <p:sldId id="8362" r:id="rId3"/>
   </p:sldIdLst>
   <p:sldSz cx="12192000" cy="6858000"/>
   <p:notesSz cx="6858000" cy="9144000"/>
@@ -107,6 +108,11 @@
       </a:defRPr>
     </a:lvl9pPr>
   </p:defaultTextStyle>
+  <p:extLst>
+    <p:ext uri="{EFAFB233-063F-42B5-8137-9DF3F51BA10A}">
+      <p15:sldGuideLst xmlns:p15="http://schemas.microsoft.com/office/powerpoint/2012/main"/>
+    </p:ext>
+  </p:extLst>
 </p:presentation>
 </file>
 
@@ -192,7 +198,7 @@
           <a:p>
             <a:fld id="{3C10C21E-484A-4B3C-92AD-6394B6195863}" type="datetimeFigureOut">
               <a:rPr lang="en-US" smtClean="0"/>
-              <a:t>6/14/2019</a:t>
+              <a:t>11/12/2020</a:t>
             </a:fld>
             <a:endParaRPr lang="en-US"/>
           </a:p>
@@ -570,7 +576,7 @@
                 <a:tabLst/>
                 <a:defRPr/>
               </a:pPr>
-              <a:t>6/14/2019 10:13 AM</a:t>
+              <a:t>11/12/2020 12:26 PM</a:t>
             </a:fld>
             <a:endParaRPr kumimoji="0" lang="en-US" sz="1800" b="0" i="0" u="none" strike="noStrike" kern="0" cap="none" spc="0" normalizeH="0" baseline="0" noProof="0" dirty="0">
               <a:ln>
@@ -869,6 +875,425 @@
     <p:extLst>
       <p:ext uri="{BB962C8B-B14F-4D97-AF65-F5344CB8AC3E}">
         <p14:creationId xmlns:p14="http://schemas.microsoft.com/office/powerpoint/2010/main" val="1337073103"/>
+      </p:ext>
+    </p:extLst>
+  </p:cSld>
+  <p:clrMapOvr>
+    <a:masterClrMapping/>
+  </p:clrMapOvr>
+</p:notes>
+</file>
+
+<file path=ppt/notesSlides/notesSlide2.xml><?xml version="1.0" encoding="utf-8"?>
+<p:notes xmlns:a="http://schemas.openxmlformats.org/drawingml/2006/main" xmlns:r="http://schemas.openxmlformats.org/officeDocument/2006/relationships" xmlns:p="http://schemas.openxmlformats.org/presentationml/2006/main">
+  <p:cSld>
+    <p:spTree>
+      <p:nvGrpSpPr>
+        <p:cNvPr id="1" name=""/>
+        <p:cNvGrpSpPr/>
+        <p:nvPr/>
+      </p:nvGrpSpPr>
+      <p:grpSpPr>
+        <a:xfrm>
+          <a:off x="0" y="0"/>
+          <a:ext cx="0" cy="0"/>
+          <a:chOff x="0" y="0"/>
+          <a:chExt cx="0" cy="0"/>
+        </a:xfrm>
+      </p:grpSpPr>
+      <p:sp>
+        <p:nvSpPr>
+          <p:cNvPr id="2" name="Slide Image Placeholder 1"/>
+          <p:cNvSpPr>
+            <a:spLocks noGrp="1" noRot="1" noChangeAspect="1"/>
+          </p:cNvSpPr>
+          <p:nvPr>
+            <p:ph type="sldImg"/>
+          </p:nvPr>
+        </p:nvSpPr>
+        <p:spPr/>
+      </p:sp>
+      <p:sp>
+        <p:nvSpPr>
+          <p:cNvPr id="3" name="Notes Placeholder 2"/>
+          <p:cNvSpPr>
+            <a:spLocks noGrp="1"/>
+          </p:cNvSpPr>
+          <p:nvPr>
+            <p:ph type="body" idx="1"/>
+          </p:nvPr>
+        </p:nvSpPr>
+        <p:spPr/>
+        <p:txBody>
+          <a:bodyPr>
+            <a:normAutofit/>
+          </a:bodyPr>
+          <a:lstStyle/>
+          <a:p>
+            <a:endParaRPr lang="en-US" dirty="0"/>
+          </a:p>
+        </p:txBody>
+      </p:sp>
+      <p:sp>
+        <p:nvSpPr>
+          <p:cNvPr id="8" name="Date Placeholder 7"/>
+          <p:cNvSpPr>
+            <a:spLocks noGrp="1"/>
+          </p:cNvSpPr>
+          <p:nvPr>
+            <p:ph type="dt" idx="10"/>
+          </p:nvPr>
+        </p:nvSpPr>
+        <p:spPr/>
+        <p:txBody>
+          <a:bodyPr/>
+          <a:lstStyle/>
+          <a:p>
+            <a:pPr marL="0" marR="0" lvl="0" indent="0" defTabSz="914400" eaLnBrk="1" fontAlgn="auto" latinLnBrk="0" hangingPunct="1">
+              <a:lnSpc>
+                <a:spcPct val="100000"/>
+              </a:lnSpc>
+              <a:spcBef>
+                <a:spcPts val="0"/>
+              </a:spcBef>
+              <a:spcAft>
+                <a:spcPts val="0"/>
+              </a:spcAft>
+              <a:buClrTx/>
+              <a:buSzTx/>
+              <a:buFontTx/>
+              <a:buNone/>
+              <a:tabLst/>
+              <a:defRPr/>
+            </a:pPr>
+            <a:fld id="{DEE42C6D-4819-4BF2-A6ED-DBB6B89153C6}" type="datetime8">
+              <a:rPr kumimoji="0" lang="en-US" sz="1800" b="0" i="0" u="none" strike="noStrike" kern="0" cap="none" spc="0" normalizeH="0" baseline="0" noProof="0" smtClean="0">
+                <a:ln>
+                  <a:noFill/>
+                </a:ln>
+                <a:solidFill>
+                  <a:sysClr val="windowText" lastClr="000000"/>
+                </a:solidFill>
+                <a:effectLst/>
+                <a:uLnTx/>
+                <a:uFillTx/>
+              </a:rPr>
+              <a:pPr marL="0" marR="0" lvl="0" indent="0" defTabSz="914400" eaLnBrk="1" fontAlgn="auto" latinLnBrk="0" hangingPunct="1">
+                <a:lnSpc>
+                  <a:spcPct val="100000"/>
+                </a:lnSpc>
+                <a:spcBef>
+                  <a:spcPts val="0"/>
+                </a:spcBef>
+                <a:spcAft>
+                  <a:spcPts val="0"/>
+                </a:spcAft>
+                <a:buClrTx/>
+                <a:buSzTx/>
+                <a:buFontTx/>
+                <a:buNone/>
+                <a:tabLst/>
+                <a:defRPr/>
+              </a:pPr>
+              <a:t>11/12/2020 12:47 PM</a:t>
+            </a:fld>
+            <a:endParaRPr kumimoji="0" lang="en-US" sz="1800" b="0" i="0" u="none" strike="noStrike" kern="0" cap="none" spc="0" normalizeH="0" baseline="0" noProof="0" dirty="0">
+              <a:ln>
+                <a:noFill/>
+              </a:ln>
+              <a:solidFill>
+                <a:sysClr val="windowText" lastClr="000000"/>
+              </a:solidFill>
+              <a:effectLst/>
+              <a:uLnTx/>
+              <a:uFillTx/>
+            </a:endParaRPr>
+          </a:p>
+        </p:txBody>
+      </p:sp>
+      <p:sp>
+        <p:nvSpPr>
+          <p:cNvPr id="9" name="Footer Placeholder 8"/>
+          <p:cNvSpPr>
+            <a:spLocks noGrp="1"/>
+          </p:cNvSpPr>
+          <p:nvPr>
+            <p:ph type="ftr" sz="quarter" idx="11"/>
+          </p:nvPr>
+        </p:nvSpPr>
+        <p:spPr/>
+        <p:txBody>
+          <a:bodyPr/>
+          <a:lstStyle/>
+          <a:p>
+            <a:pPr marL="0" marR="0" lvl="0" indent="0" defTabSz="914099" eaLnBrk="0" fontAlgn="auto" latinLnBrk="0" hangingPunct="0">
+              <a:lnSpc>
+                <a:spcPct val="100000"/>
+              </a:lnSpc>
+              <a:spcBef>
+                <a:spcPts val="0"/>
+              </a:spcBef>
+              <a:spcAft>
+                <a:spcPts val="0"/>
+              </a:spcAft>
+              <a:buClrTx/>
+              <a:buSzTx/>
+              <a:buFontTx/>
+              <a:buNone/>
+              <a:tabLst/>
+              <a:defRPr/>
+            </a:pPr>
+            <a:r>
+              <a:rPr kumimoji="0" lang="en-US" sz="400" b="0" i="0" u="none" strike="noStrike" kern="0" cap="none" spc="0" normalizeH="0" baseline="0" noProof="0" dirty="0">
+                <a:ln>
+                  <a:noFill/>
+                </a:ln>
+                <a:gradFill>
+                  <a:gsLst>
+                    <a:gs pos="0">
+                      <a:prstClr val="black"/>
+                    </a:gs>
+                    <a:gs pos="100000">
+                      <a:prstClr val="black"/>
+                    </a:gs>
+                  </a:gsLst>
+                  <a:lin ang="5400000" scaled="0"/>
+                </a:gradFill>
+                <a:effectLst/>
+                <a:uLnTx/>
+                <a:uFillTx/>
+                <a:latin typeface="Segoe UI" pitchFamily="34" charset="0"/>
+                <a:ea typeface="Segoe UI" pitchFamily="34" charset="0"/>
+                <a:cs typeface="Segoe UI" pitchFamily="34" charset="0"/>
+              </a:rPr>
+              <a:t>© 2012 Microsoft Corporation. All rights reserved. Microsoft, Windows, Windows Vista and other product names are or may be registered trademarks and/or trademarks in the U.S. and/or other countries.</a:t>
+            </a:r>
+          </a:p>
+          <a:p>
+            <a:pPr marL="0" marR="0" lvl="0" indent="0" defTabSz="914099" eaLnBrk="0" fontAlgn="auto" latinLnBrk="0" hangingPunct="0">
+              <a:lnSpc>
+                <a:spcPct val="100000"/>
+              </a:lnSpc>
+              <a:spcBef>
+                <a:spcPts val="0"/>
+              </a:spcBef>
+              <a:spcAft>
+                <a:spcPts val="0"/>
+              </a:spcAft>
+              <a:buClrTx/>
+              <a:buSzTx/>
+              <a:buFontTx/>
+              <a:buNone/>
+              <a:tabLst/>
+              <a:defRPr/>
+            </a:pPr>
+            <a:r>
+              <a:rPr kumimoji="0" lang="en-US" sz="400" b="0" i="0" u="none" strike="noStrike" kern="0" cap="none" spc="0" normalizeH="0" baseline="0" noProof="0" dirty="0">
+                <a:ln>
+                  <a:noFill/>
+                </a:ln>
+                <a:gradFill>
+                  <a:gsLst>
+                    <a:gs pos="0">
+                      <a:prstClr val="black"/>
+                    </a:gs>
+                    <a:gs pos="100000">
+                      <a:prstClr val="black"/>
+                    </a:gs>
+                  </a:gsLst>
+                  <a:lin ang="5400000" scaled="0"/>
+                </a:gradFill>
+                <a:effectLst/>
+                <a:uLnTx/>
+                <a:uFillTx/>
+                <a:latin typeface="Segoe UI" pitchFamily="34" charset="0"/>
+                <a:ea typeface="Segoe UI" pitchFamily="34" charset="0"/>
+                <a:cs typeface="Segoe UI" pitchFamily="34" charset="0"/>
+              </a:rPr>
+              <a:t>The information herein is for informational purposes only and represents the current view of Microsoft Corporation as of the date of this presentation. Because Microsoft must respond to changing market conditions, it should not be interpreted to be a commitment on the part of Microsoft, and Microsoft cannot guarantee the accuracy of any information provided after the date of this presentation. </a:t>
+            </a:r>
+            <a:br>
+              <a:rPr kumimoji="0" lang="en-US" sz="400" b="0" i="0" u="none" strike="noStrike" kern="0" cap="none" spc="0" normalizeH="0" baseline="0" noProof="0" dirty="0">
+                <a:ln>
+                  <a:noFill/>
+                </a:ln>
+                <a:gradFill>
+                  <a:gsLst>
+                    <a:gs pos="0">
+                      <a:prstClr val="black"/>
+                    </a:gs>
+                    <a:gs pos="100000">
+                      <a:prstClr val="black"/>
+                    </a:gs>
+                  </a:gsLst>
+                  <a:lin ang="5400000" scaled="0"/>
+                </a:gradFill>
+                <a:effectLst/>
+                <a:uLnTx/>
+                <a:uFillTx/>
+                <a:latin typeface="Segoe UI" pitchFamily="34" charset="0"/>
+                <a:ea typeface="Segoe UI" pitchFamily="34" charset="0"/>
+                <a:cs typeface="Segoe UI" pitchFamily="34" charset="0"/>
+              </a:rPr>
+            </a:br>
+            <a:r>
+              <a:rPr kumimoji="0" lang="en-US" sz="400" b="0" i="0" u="none" strike="noStrike" kern="0" cap="none" spc="0" normalizeH="0" baseline="0" noProof="0" dirty="0">
+                <a:ln>
+                  <a:noFill/>
+                </a:ln>
+                <a:gradFill>
+                  <a:gsLst>
+                    <a:gs pos="0">
+                      <a:prstClr val="black"/>
+                    </a:gs>
+                    <a:gs pos="100000">
+                      <a:prstClr val="black"/>
+                    </a:gs>
+                  </a:gsLst>
+                  <a:lin ang="5400000" scaled="0"/>
+                </a:gradFill>
+                <a:effectLst/>
+                <a:uLnTx/>
+                <a:uFillTx/>
+                <a:latin typeface="Segoe UI" pitchFamily="34" charset="0"/>
+                <a:ea typeface="Segoe UI" pitchFamily="34" charset="0"/>
+                <a:cs typeface="Segoe UI" pitchFamily="34" charset="0"/>
+              </a:rPr>
+              <a:t>MICROSOFT MAKES NO WARRANTIES, EXPRESS, IMPLIED OR STATUTORY, AS TO THE INFORMATION IN THIS PRESENTATION.</a:t>
+            </a:r>
+          </a:p>
+        </p:txBody>
+      </p:sp>
+      <p:sp>
+        <p:nvSpPr>
+          <p:cNvPr id="10" name="Slide Number Placeholder 9"/>
+          <p:cNvSpPr>
+            <a:spLocks noGrp="1"/>
+          </p:cNvSpPr>
+          <p:nvPr>
+            <p:ph type="sldNum" sz="quarter" idx="12"/>
+          </p:nvPr>
+        </p:nvSpPr>
+        <p:spPr/>
+        <p:txBody>
+          <a:bodyPr/>
+          <a:lstStyle/>
+          <a:p>
+            <a:pPr marL="0" marR="0" lvl="0" indent="0" defTabSz="914400" eaLnBrk="1" fontAlgn="auto" latinLnBrk="0" hangingPunct="1">
+              <a:lnSpc>
+                <a:spcPct val="100000"/>
+              </a:lnSpc>
+              <a:spcBef>
+                <a:spcPts val="0"/>
+              </a:spcBef>
+              <a:spcAft>
+                <a:spcPts val="0"/>
+              </a:spcAft>
+              <a:buClrTx/>
+              <a:buSzTx/>
+              <a:buFontTx/>
+              <a:buNone/>
+              <a:tabLst/>
+              <a:defRPr/>
+            </a:pPr>
+            <a:fld id="{8B263312-38AA-4E1E-B2B5-0F8F122B24FE}" type="slidenum">
+              <a:rPr kumimoji="0" lang="en-US" sz="1800" b="0" i="0" u="none" strike="noStrike" kern="0" cap="none" spc="0" normalizeH="0" baseline="0" noProof="0" smtClean="0">
+                <a:ln>
+                  <a:noFill/>
+                </a:ln>
+                <a:solidFill>
+                  <a:sysClr val="windowText" lastClr="000000"/>
+                </a:solidFill>
+                <a:effectLst/>
+                <a:uLnTx/>
+                <a:uFillTx/>
+              </a:rPr>
+              <a:pPr marL="0" marR="0" lvl="0" indent="0" defTabSz="914400" eaLnBrk="1" fontAlgn="auto" latinLnBrk="0" hangingPunct="1">
+                <a:lnSpc>
+                  <a:spcPct val="100000"/>
+                </a:lnSpc>
+                <a:spcBef>
+                  <a:spcPts val="0"/>
+                </a:spcBef>
+                <a:spcAft>
+                  <a:spcPts val="0"/>
+                </a:spcAft>
+                <a:buClrTx/>
+                <a:buSzTx/>
+                <a:buFontTx/>
+                <a:buNone/>
+                <a:tabLst/>
+                <a:defRPr/>
+              </a:pPr>
+              <a:t>2</a:t>
+            </a:fld>
+            <a:endParaRPr kumimoji="0" lang="en-US" sz="1800" b="0" i="0" u="none" strike="noStrike" kern="0" cap="none" spc="0" normalizeH="0" baseline="0" noProof="0" dirty="0">
+              <a:ln>
+                <a:noFill/>
+              </a:ln>
+              <a:solidFill>
+                <a:sysClr val="windowText" lastClr="000000"/>
+              </a:solidFill>
+              <a:effectLst/>
+              <a:uLnTx/>
+              <a:uFillTx/>
+            </a:endParaRPr>
+          </a:p>
+        </p:txBody>
+      </p:sp>
+      <p:sp>
+        <p:nvSpPr>
+          <p:cNvPr id="11" name="Header Placeholder 10"/>
+          <p:cNvSpPr>
+            <a:spLocks noGrp="1"/>
+          </p:cNvSpPr>
+          <p:nvPr>
+            <p:ph type="hdr" sz="quarter" idx="13"/>
+          </p:nvPr>
+        </p:nvSpPr>
+        <p:spPr/>
+        <p:txBody>
+          <a:bodyPr/>
+          <a:lstStyle/>
+          <a:p>
+            <a:pPr marL="0" marR="0" lvl="0" indent="0" defTabSz="914400" eaLnBrk="1" fontAlgn="auto" latinLnBrk="0" hangingPunct="1">
+              <a:lnSpc>
+                <a:spcPct val="100000"/>
+              </a:lnSpc>
+              <a:spcBef>
+                <a:spcPts val="0"/>
+              </a:spcBef>
+              <a:spcAft>
+                <a:spcPts val="0"/>
+              </a:spcAft>
+              <a:buClrTx/>
+              <a:buSzTx/>
+              <a:buFontTx/>
+              <a:buNone/>
+              <a:tabLst/>
+              <a:defRPr/>
+            </a:pPr>
+            <a:r>
+              <a:rPr kumimoji="0" lang="en-US" sz="1800" b="0" i="0" u="none" strike="noStrike" kern="0" cap="none" spc="0" normalizeH="0" baseline="0" noProof="0" dirty="0">
+                <a:ln>
+                  <a:noFill/>
+                </a:ln>
+                <a:solidFill>
+                  <a:sysClr val="windowText" lastClr="000000"/>
+                </a:solidFill>
+                <a:effectLst/>
+                <a:uLnTx/>
+                <a:uFillTx/>
+              </a:rPr>
+              <a:t>Tech Ready 15</a:t>
+            </a:r>
+          </a:p>
+        </p:txBody>
+      </p:sp>
+    </p:spTree>
+    <p:extLst>
+      <p:ext uri="{BB962C8B-B14F-4D97-AF65-F5344CB8AC3E}">
+        <p14:creationId xmlns:p14="http://schemas.microsoft.com/office/powerpoint/2010/main" val="186545022"/>
       </p:ext>
     </p:extLst>
   </p:cSld>
@@ -1025,7 +1450,7 @@
           <a:p>
             <a:fld id="{00D9E8BE-1068-46B4-AEC7-B4BBDB41171D}" type="datetimeFigureOut">
               <a:rPr lang="en-US" smtClean="0"/>
-              <a:t>6/14/2019</a:t>
+              <a:t>11/12/2020</a:t>
             </a:fld>
             <a:endParaRPr lang="en-US"/>
           </a:p>
@@ -1223,7 +1648,7 @@
           <a:p>
             <a:fld id="{00D9E8BE-1068-46B4-AEC7-B4BBDB41171D}" type="datetimeFigureOut">
               <a:rPr lang="en-US" smtClean="0"/>
-              <a:t>6/14/2019</a:t>
+              <a:t>11/12/2020</a:t>
             </a:fld>
             <a:endParaRPr lang="en-US"/>
           </a:p>
@@ -1431,7 +1856,7 @@
           <a:p>
             <a:fld id="{00D9E8BE-1068-46B4-AEC7-B4BBDB41171D}" type="datetimeFigureOut">
               <a:rPr lang="en-US" smtClean="0"/>
-              <a:t>6/14/2019</a:t>
+              <a:t>11/12/2020</a:t>
             </a:fld>
             <a:endParaRPr lang="en-US"/>
           </a:p>
@@ -1629,7 +2054,7 @@
           <a:p>
             <a:fld id="{00D9E8BE-1068-46B4-AEC7-B4BBDB41171D}" type="datetimeFigureOut">
               <a:rPr lang="en-US" smtClean="0"/>
-              <a:t>6/14/2019</a:t>
+              <a:t>11/12/2020</a:t>
             </a:fld>
             <a:endParaRPr lang="en-US"/>
           </a:p>
@@ -1904,7 +2329,7 @@
           <a:p>
             <a:fld id="{00D9E8BE-1068-46B4-AEC7-B4BBDB41171D}" type="datetimeFigureOut">
               <a:rPr lang="en-US" smtClean="0"/>
-              <a:t>6/14/2019</a:t>
+              <a:t>11/12/2020</a:t>
             </a:fld>
             <a:endParaRPr lang="en-US"/>
           </a:p>
@@ -2169,7 +2594,7 @@
           <a:p>
             <a:fld id="{00D9E8BE-1068-46B4-AEC7-B4BBDB41171D}" type="datetimeFigureOut">
               <a:rPr lang="en-US" smtClean="0"/>
-              <a:t>6/14/2019</a:t>
+              <a:t>11/12/2020</a:t>
             </a:fld>
             <a:endParaRPr lang="en-US"/>
           </a:p>
@@ -2581,7 +3006,7 @@
           <a:p>
             <a:fld id="{00D9E8BE-1068-46B4-AEC7-B4BBDB41171D}" type="datetimeFigureOut">
               <a:rPr lang="en-US" smtClean="0"/>
-              <a:t>6/14/2019</a:t>
+              <a:t>11/12/2020</a:t>
             </a:fld>
             <a:endParaRPr lang="en-US"/>
           </a:p>
@@ -2722,7 +3147,7 @@
           <a:p>
             <a:fld id="{00D9E8BE-1068-46B4-AEC7-B4BBDB41171D}" type="datetimeFigureOut">
               <a:rPr lang="en-US" smtClean="0"/>
-              <a:t>6/14/2019</a:t>
+              <a:t>11/12/2020</a:t>
             </a:fld>
             <a:endParaRPr lang="en-US"/>
           </a:p>
@@ -2835,7 +3260,7 @@
           <a:p>
             <a:fld id="{00D9E8BE-1068-46B4-AEC7-B4BBDB41171D}" type="datetimeFigureOut">
               <a:rPr lang="en-US" smtClean="0"/>
-              <a:t>6/14/2019</a:t>
+              <a:t>11/12/2020</a:t>
             </a:fld>
             <a:endParaRPr lang="en-US"/>
           </a:p>
@@ -3146,7 +3571,7 @@
           <a:p>
             <a:fld id="{00D9E8BE-1068-46B4-AEC7-B4BBDB41171D}" type="datetimeFigureOut">
               <a:rPr lang="en-US" smtClean="0"/>
-              <a:t>6/14/2019</a:t>
+              <a:t>11/12/2020</a:t>
             </a:fld>
             <a:endParaRPr lang="en-US"/>
           </a:p>
@@ -3434,7 +3859,7 @@
           <a:p>
             <a:fld id="{00D9E8BE-1068-46B4-AEC7-B4BBDB41171D}" type="datetimeFigureOut">
               <a:rPr lang="en-US" smtClean="0"/>
-              <a:t>6/14/2019</a:t>
+              <a:t>11/12/2020</a:t>
             </a:fld>
             <a:endParaRPr lang="en-US"/>
           </a:p>
@@ -3675,7 +4100,7 @@
           <a:p>
             <a:fld id="{00D9E8BE-1068-46B4-AEC7-B4BBDB41171D}" type="datetimeFigureOut">
               <a:rPr lang="en-US" smtClean="0"/>
-              <a:t>6/14/2019</a:t>
+              <a:t>11/12/2020</a:t>
             </a:fld>
             <a:endParaRPr lang="en-US"/>
           </a:p>
@@ -4104,8 +4529,8 @@
         </p:nvSpPr>
         <p:spPr>
           <a:xfrm>
-            <a:off x="330466" y="-2675"/>
-            <a:ext cx="3822434" cy="899665"/>
+            <a:off x="-408" y="-900953"/>
+            <a:ext cx="6862506" cy="899665"/>
           </a:xfrm>
         </p:spPr>
         <p:txBody>
@@ -4121,7 +4546,7 @@
                 </a:solidFill>
                 <a:cs typeface="Segoe UI Light" charset="0"/>
               </a:rPr>
-              <a:t>Lab Architecture</a:t>
+              <a:t>Lab Architecture – June 2020</a:t>
             </a:r>
             <a:endParaRPr lang="en-US" sz="4000" cap="all" spc="800" dirty="0">
               <a:solidFill>
@@ -7427,7 +7852,4274 @@
         <p:fade/>
       </p:transition>
     </mc:Choice>
-    <mc:Fallback xmlns="" xmlns:a16="http://schemas.microsoft.com/office/drawing/2014/main">
+    <mc:Fallback xmlns:a16="http://schemas.microsoft.com/office/drawing/2014/main" xmlns="">
+      <p:transition spd="med">
+        <p:fade/>
+      </p:transition>
+    </mc:Fallback>
+  </mc:AlternateContent>
+</p:sld>
+</file>
+
+<file path=ppt/slides/slide2.xml><?xml version="1.0" encoding="utf-8"?>
+<p:sld xmlns:a="http://schemas.openxmlformats.org/drawingml/2006/main" xmlns:r="http://schemas.openxmlformats.org/officeDocument/2006/relationships" xmlns:p="http://schemas.openxmlformats.org/presentationml/2006/main">
+  <p:cSld>
+    <p:spTree>
+      <p:nvGrpSpPr>
+        <p:cNvPr id="1" name=""/>
+        <p:cNvGrpSpPr/>
+        <p:nvPr/>
+      </p:nvGrpSpPr>
+      <p:grpSpPr>
+        <a:xfrm>
+          <a:off x="0" y="0"/>
+          <a:ext cx="0" cy="0"/>
+          <a:chOff x="0" y="0"/>
+          <a:chExt cx="0" cy="0"/>
+        </a:xfrm>
+      </p:grpSpPr>
+      <p:sp>
+        <p:nvSpPr>
+          <p:cNvPr id="5" name="Title 4"/>
+          <p:cNvSpPr>
+            <a:spLocks noGrp="1"/>
+          </p:cNvSpPr>
+          <p:nvPr>
+            <p:ph type="title"/>
+          </p:nvPr>
+        </p:nvSpPr>
+        <p:spPr>
+          <a:xfrm>
+            <a:off x="-49727" y="-720536"/>
+            <a:ext cx="9524807" cy="899665"/>
+          </a:xfrm>
+        </p:spPr>
+        <p:txBody>
+          <a:bodyPr vert="horz" wrap="square" lIns="146304" tIns="91440" rIns="146304" bIns="91440" rtlCol="0" anchor="ctr">
+            <a:noAutofit/>
+          </a:bodyPr>
+          <a:lstStyle/>
+          <a:p>
+            <a:r>
+              <a:rPr lang="en-US" sz="4000" dirty="0">
+                <a:solidFill>
+                  <a:schemeClr val="tx2"/>
+                </a:solidFill>
+                <a:cs typeface="Segoe UI Light" charset="0"/>
+              </a:rPr>
+              <a:t>Preferred Solution – September 2020</a:t>
+            </a:r>
+            <a:endParaRPr lang="en-US" sz="4000" cap="all" spc="800" dirty="0">
+              <a:solidFill>
+                <a:srgbClr val="0078D7"/>
+              </a:solidFill>
+              <a:latin typeface="Segoe UI Light" charset="0"/>
+              <a:cs typeface="Segoe UI Light" charset="0"/>
+            </a:endParaRPr>
+          </a:p>
+        </p:txBody>
+      </p:sp>
+      <p:sp>
+        <p:nvSpPr>
+          <p:cNvPr id="269" name="Rectangle 268">
+            <a:extLst>
+              <a:ext uri="{FF2B5EF4-FFF2-40B4-BE49-F238E27FC236}">
+                <a16:creationId xmlns:a16="http://schemas.microsoft.com/office/drawing/2014/main" id="{B4CF7B6F-8BD0-40D6-84E5-B9724E17ACDF}"/>
+              </a:ext>
+            </a:extLst>
+          </p:cNvPr>
+          <p:cNvSpPr/>
+          <p:nvPr/>
+        </p:nvSpPr>
+        <p:spPr>
+          <a:xfrm>
+            <a:off x="8340378" y="4067805"/>
+            <a:ext cx="1712328" cy="369332"/>
+          </a:xfrm>
+          <a:prstGeom prst="rect">
+            <a:avLst/>
+          </a:prstGeom>
+        </p:spPr>
+        <p:txBody>
+          <a:bodyPr wrap="none">
+            <a:spAutoFit/>
+          </a:bodyPr>
+          <a:lstStyle/>
+          <a:p>
+            <a:pPr algn="ctr" defTabSz="950973"/>
+            <a:r>
+              <a:rPr lang="en-US" sz="900" kern="0" dirty="0">
+                <a:latin typeface="Segoe UI Semibold" panose="020B0702040204020203" pitchFamily="34" charset="0"/>
+                <a:ea typeface="MS PGothic" panose="020B0600070205080204" pitchFamily="34" charset="-128"/>
+                <a:cs typeface="Segoe UI Semibold" panose="020B0702040204020203" pitchFamily="34" charset="0"/>
+              </a:rPr>
+              <a:t>Azure Databricks</a:t>
+            </a:r>
+            <a:br>
+              <a:rPr lang="en-US" sz="900" kern="0" dirty="0">
+                <a:latin typeface="Segoe UI Semibold" panose="020B0702040204020203" pitchFamily="34" charset="0"/>
+                <a:ea typeface="MS PGothic" panose="020B0600070205080204" pitchFamily="34" charset="-128"/>
+                <a:cs typeface="Segoe UI Semibold" panose="020B0702040204020203" pitchFamily="34" charset="0"/>
+              </a:rPr>
+            </a:br>
+            <a:r>
+              <a:rPr lang="en-US" sz="900" kern="0" dirty="0">
+                <a:latin typeface="Segoe UI Semibold" panose="020B0702040204020203" pitchFamily="34" charset="0"/>
+                <a:ea typeface="MS PGothic" panose="020B0600070205080204" pitchFamily="34" charset="-128"/>
+                <a:cs typeface="Segoe UI Semibold" panose="020B0702040204020203" pitchFamily="34" charset="0"/>
+              </a:rPr>
+              <a:t>(Spark Structured Streaming)</a:t>
+            </a:r>
+          </a:p>
+        </p:txBody>
+      </p:sp>
+      <p:pic>
+        <p:nvPicPr>
+          <p:cNvPr id="272" name="Picture 271">
+            <a:extLst>
+              <a:ext uri="{FF2B5EF4-FFF2-40B4-BE49-F238E27FC236}">
+                <a16:creationId xmlns:a16="http://schemas.microsoft.com/office/drawing/2014/main" id="{F23D66EC-D378-4182-8433-67F4C4143D73}"/>
+              </a:ext>
+            </a:extLst>
+          </p:cNvPr>
+          <p:cNvPicPr>
+            <a:picLocks noChangeAspect="1"/>
+          </p:cNvPicPr>
+          <p:nvPr/>
+        </p:nvPicPr>
+        <p:blipFill>
+          <a:blip r:embed="rId3">
+            <a:extLst>
+              <a:ext uri="{96DAC541-7B7A-43D3-8B79-37D633B846F1}">
+                <asvg:svgBlip xmlns:asvg="http://schemas.microsoft.com/office/drawing/2016/SVG/main" r:embed="rId4"/>
+              </a:ext>
+            </a:extLst>
+          </a:blip>
+          <a:stretch>
+            <a:fillRect/>
+          </a:stretch>
+        </p:blipFill>
+        <p:spPr>
+          <a:xfrm>
+            <a:off x="8867467" y="3417386"/>
+            <a:ext cx="670390" cy="670390"/>
+          </a:xfrm>
+          <a:prstGeom prst="rect">
+            <a:avLst/>
+          </a:prstGeom>
+        </p:spPr>
+      </p:pic>
+      <p:sp>
+        <p:nvSpPr>
+          <p:cNvPr id="15" name="Rectangle: Rounded Corners 14">
+            <a:extLst>
+              <a:ext uri="{FF2B5EF4-FFF2-40B4-BE49-F238E27FC236}">
+                <a16:creationId xmlns:a16="http://schemas.microsoft.com/office/drawing/2014/main" id="{6FD4FF3D-04E7-4AB8-A851-31852443E90E}"/>
+              </a:ext>
+            </a:extLst>
+          </p:cNvPr>
+          <p:cNvSpPr/>
+          <p:nvPr/>
+        </p:nvSpPr>
+        <p:spPr bwMode="auto">
+          <a:xfrm>
+            <a:off x="3446466" y="2606194"/>
+            <a:ext cx="1797341" cy="1152144"/>
+          </a:xfrm>
+          <a:prstGeom prst="roundRect">
+            <a:avLst/>
+          </a:prstGeom>
+          <a:noFill/>
+          <a:ln>
+            <a:solidFill>
+              <a:srgbClr val="002060"/>
+            </a:solidFill>
+            <a:prstDash val="sysDash"/>
+            <a:headEnd type="none" w="med" len="med"/>
+            <a:tailEnd type="none" w="med" len="med"/>
+          </a:ln>
+          <a:effectLst/>
+        </p:spPr>
+        <p:style>
+          <a:lnRef idx="1">
+            <a:schemeClr val="accent2"/>
+          </a:lnRef>
+          <a:fillRef idx="3">
+            <a:schemeClr val="accent2"/>
+          </a:fillRef>
+          <a:effectRef idx="2">
+            <a:schemeClr val="accent2"/>
+          </a:effectRef>
+          <a:fontRef idx="minor">
+            <a:schemeClr val="lt1"/>
+          </a:fontRef>
+        </p:style>
+        <p:txBody>
+          <a:bodyPr rot="0" spcFirstLastPara="0" vertOverflow="overflow" horzOverflow="overflow" vert="horz" wrap="square" lIns="182880" tIns="146304" rIns="182880" bIns="146304" numCol="1" spcCol="0" rtlCol="0" fromWordArt="0" anchor="t" anchorCtr="0" forceAA="0" compatLnSpc="1">
+            <a:prstTxWarp prst="textNoShape">
+              <a:avLst/>
+            </a:prstTxWarp>
+            <a:noAutofit/>
+          </a:bodyPr>
+          <a:lstStyle/>
+          <a:p>
+            <a:pPr algn="ctr" defTabSz="932472" fontAlgn="base">
+              <a:lnSpc>
+                <a:spcPct val="90000"/>
+              </a:lnSpc>
+              <a:spcBef>
+                <a:spcPct val="0"/>
+              </a:spcBef>
+              <a:spcAft>
+                <a:spcPct val="0"/>
+              </a:spcAft>
+            </a:pPr>
+            <a:endParaRPr lang="en-US" sz="2400" dirty="0" err="1">
+              <a:gradFill>
+                <a:gsLst>
+                  <a:gs pos="0">
+                    <a:srgbClr val="FFFFFF"/>
+                  </a:gs>
+                  <a:gs pos="100000">
+                    <a:srgbClr val="FFFFFF"/>
+                  </a:gs>
+                </a:gsLst>
+                <a:lin ang="5400000" scaled="0"/>
+              </a:gradFill>
+              <a:ea typeface="Segoe UI" pitchFamily="34" charset="0"/>
+              <a:cs typeface="Segoe UI" pitchFamily="34" charset="0"/>
+            </a:endParaRPr>
+          </a:p>
+        </p:txBody>
+      </p:sp>
+      <p:sp>
+        <p:nvSpPr>
+          <p:cNvPr id="276" name="Rectangle: Rounded Corners 275">
+            <a:extLst>
+              <a:ext uri="{FF2B5EF4-FFF2-40B4-BE49-F238E27FC236}">
+                <a16:creationId xmlns:a16="http://schemas.microsoft.com/office/drawing/2014/main" id="{CAC82709-48BD-4238-9AD2-A9D7B326F14A}"/>
+              </a:ext>
+            </a:extLst>
+          </p:cNvPr>
+          <p:cNvSpPr/>
+          <p:nvPr/>
+        </p:nvSpPr>
+        <p:spPr bwMode="auto">
+          <a:xfrm>
+            <a:off x="8289662" y="3305659"/>
+            <a:ext cx="1760026" cy="1147743"/>
+          </a:xfrm>
+          <a:prstGeom prst="roundRect">
+            <a:avLst/>
+          </a:prstGeom>
+          <a:noFill/>
+          <a:ln>
+            <a:solidFill>
+              <a:srgbClr val="002060"/>
+            </a:solidFill>
+            <a:prstDash val="sysDash"/>
+            <a:headEnd type="none" w="med" len="med"/>
+            <a:tailEnd type="none" w="med" len="med"/>
+          </a:ln>
+          <a:effectLst/>
+        </p:spPr>
+        <p:style>
+          <a:lnRef idx="1">
+            <a:schemeClr val="accent2"/>
+          </a:lnRef>
+          <a:fillRef idx="3">
+            <a:schemeClr val="accent2"/>
+          </a:fillRef>
+          <a:effectRef idx="2">
+            <a:schemeClr val="accent2"/>
+          </a:effectRef>
+          <a:fontRef idx="minor">
+            <a:schemeClr val="lt1"/>
+          </a:fontRef>
+        </p:style>
+        <p:txBody>
+          <a:bodyPr rot="0" spcFirstLastPara="0" vertOverflow="overflow" horzOverflow="overflow" vert="horz" wrap="square" lIns="182880" tIns="146304" rIns="182880" bIns="146304" numCol="1" spcCol="0" rtlCol="0" fromWordArt="0" anchor="t" anchorCtr="0" forceAA="0" compatLnSpc="1">
+            <a:prstTxWarp prst="textNoShape">
+              <a:avLst/>
+            </a:prstTxWarp>
+            <a:noAutofit/>
+          </a:bodyPr>
+          <a:lstStyle/>
+          <a:p>
+            <a:pPr algn="ctr" defTabSz="932472" fontAlgn="base">
+              <a:lnSpc>
+                <a:spcPct val="90000"/>
+              </a:lnSpc>
+              <a:spcBef>
+                <a:spcPct val="0"/>
+              </a:spcBef>
+              <a:spcAft>
+                <a:spcPct val="0"/>
+              </a:spcAft>
+            </a:pPr>
+            <a:endParaRPr lang="en-US" sz="2400" dirty="0" err="1">
+              <a:gradFill>
+                <a:gsLst>
+                  <a:gs pos="0">
+                    <a:srgbClr val="FFFFFF"/>
+                  </a:gs>
+                  <a:gs pos="100000">
+                    <a:srgbClr val="FFFFFF"/>
+                  </a:gs>
+                </a:gsLst>
+                <a:lin ang="5400000" scaled="0"/>
+              </a:gradFill>
+              <a:ea typeface="Segoe UI" pitchFamily="34" charset="0"/>
+              <a:cs typeface="Segoe UI" pitchFamily="34" charset="0"/>
+            </a:endParaRPr>
+          </a:p>
+        </p:txBody>
+      </p:sp>
+      <p:sp>
+        <p:nvSpPr>
+          <p:cNvPr id="277" name="Rectangle: Rounded Corners 276">
+            <a:extLst>
+              <a:ext uri="{FF2B5EF4-FFF2-40B4-BE49-F238E27FC236}">
+                <a16:creationId xmlns:a16="http://schemas.microsoft.com/office/drawing/2014/main" id="{019195CF-64F7-4417-A854-54D147E1A90A}"/>
+              </a:ext>
+            </a:extLst>
+          </p:cNvPr>
+          <p:cNvSpPr/>
+          <p:nvPr/>
+        </p:nvSpPr>
+        <p:spPr bwMode="auto">
+          <a:xfrm>
+            <a:off x="4732731" y="800307"/>
+            <a:ext cx="1582269" cy="1542846"/>
+          </a:xfrm>
+          <a:prstGeom prst="roundRect">
+            <a:avLst/>
+          </a:prstGeom>
+          <a:noFill/>
+          <a:ln>
+            <a:solidFill>
+              <a:srgbClr val="002060"/>
+            </a:solidFill>
+            <a:prstDash val="sysDash"/>
+            <a:headEnd type="none" w="med" len="med"/>
+            <a:tailEnd type="none" w="med" len="med"/>
+          </a:ln>
+          <a:effectLst/>
+        </p:spPr>
+        <p:style>
+          <a:lnRef idx="1">
+            <a:schemeClr val="accent2"/>
+          </a:lnRef>
+          <a:fillRef idx="3">
+            <a:schemeClr val="accent2"/>
+          </a:fillRef>
+          <a:effectRef idx="2">
+            <a:schemeClr val="accent2"/>
+          </a:effectRef>
+          <a:fontRef idx="minor">
+            <a:schemeClr val="lt1"/>
+          </a:fontRef>
+        </p:style>
+        <p:txBody>
+          <a:bodyPr rot="0" spcFirstLastPara="0" vertOverflow="overflow" horzOverflow="overflow" vert="horz" wrap="square" lIns="182880" tIns="146304" rIns="182880" bIns="146304" numCol="1" spcCol="0" rtlCol="0" fromWordArt="0" anchor="t" anchorCtr="0" forceAA="0" compatLnSpc="1">
+            <a:prstTxWarp prst="textNoShape">
+              <a:avLst/>
+            </a:prstTxWarp>
+            <a:noAutofit/>
+          </a:bodyPr>
+          <a:lstStyle/>
+          <a:p>
+            <a:pPr algn="ctr" defTabSz="932472" fontAlgn="base">
+              <a:lnSpc>
+                <a:spcPct val="90000"/>
+              </a:lnSpc>
+              <a:spcBef>
+                <a:spcPct val="0"/>
+              </a:spcBef>
+              <a:spcAft>
+                <a:spcPct val="0"/>
+              </a:spcAft>
+            </a:pPr>
+            <a:endParaRPr lang="en-US" sz="2400" dirty="0" err="1">
+              <a:gradFill>
+                <a:gsLst>
+                  <a:gs pos="0">
+                    <a:srgbClr val="FFFFFF"/>
+                  </a:gs>
+                  <a:gs pos="100000">
+                    <a:srgbClr val="FFFFFF"/>
+                  </a:gs>
+                </a:gsLst>
+                <a:lin ang="5400000" scaled="0"/>
+              </a:gradFill>
+              <a:ea typeface="Segoe UI" pitchFamily="34" charset="0"/>
+              <a:cs typeface="Segoe UI" pitchFamily="34" charset="0"/>
+            </a:endParaRPr>
+          </a:p>
+        </p:txBody>
+      </p:sp>
+      <p:sp>
+        <p:nvSpPr>
+          <p:cNvPr id="296" name="TextBox 295">
+            <a:extLst>
+              <a:ext uri="{FF2B5EF4-FFF2-40B4-BE49-F238E27FC236}">
+                <a16:creationId xmlns:a16="http://schemas.microsoft.com/office/drawing/2014/main" id="{F08191CC-FE9D-462B-87B9-448E4C0D30B8}"/>
+              </a:ext>
+            </a:extLst>
+          </p:cNvPr>
+          <p:cNvSpPr txBox="1"/>
+          <p:nvPr/>
+        </p:nvSpPr>
+        <p:spPr>
+          <a:xfrm>
+            <a:off x="4664927" y="216130"/>
+            <a:ext cx="1803763" cy="683264"/>
+          </a:xfrm>
+          <a:prstGeom prst="rect">
+            <a:avLst/>
+          </a:prstGeom>
+          <a:noFill/>
+        </p:spPr>
+        <p:txBody>
+          <a:bodyPr wrap="none" lIns="182880" tIns="146304" rIns="182880" bIns="146304" rtlCol="0">
+            <a:spAutoFit/>
+          </a:bodyPr>
+          <a:lstStyle/>
+          <a:p>
+            <a:pPr algn="ctr">
+              <a:lnSpc>
+                <a:spcPct val="90000"/>
+              </a:lnSpc>
+            </a:pPr>
+            <a:r>
+              <a:rPr lang="en-US" sz="1400" dirty="0">
+                <a:gradFill>
+                  <a:gsLst>
+                    <a:gs pos="2917">
+                      <a:schemeClr val="tx1"/>
+                    </a:gs>
+                    <a:gs pos="30000">
+                      <a:schemeClr val="tx1"/>
+                    </a:gs>
+                  </a:gsLst>
+                  <a:lin ang="5400000" scaled="0"/>
+                </a:gradFill>
+              </a:rPr>
+              <a:t>DATA PREPARATION</a:t>
+            </a:r>
+          </a:p>
+          <a:p>
+            <a:pPr algn="ctr">
+              <a:lnSpc>
+                <a:spcPct val="90000"/>
+              </a:lnSpc>
+            </a:pPr>
+            <a:r>
+              <a:rPr lang="en-US" sz="1400" dirty="0">
+                <a:gradFill>
+                  <a:gsLst>
+                    <a:gs pos="2917">
+                      <a:schemeClr val="tx1"/>
+                    </a:gs>
+                    <a:gs pos="30000">
+                      <a:schemeClr val="tx1"/>
+                    </a:gs>
+                  </a:gsLst>
+                  <a:lin ang="5400000" scaled="0"/>
+                </a:gradFill>
+              </a:rPr>
+              <a:t>MODEL TRAINING</a:t>
+            </a:r>
+          </a:p>
+        </p:txBody>
+      </p:sp>
+      <p:sp>
+        <p:nvSpPr>
+          <p:cNvPr id="303" name="TextBox 302">
+            <a:extLst>
+              <a:ext uri="{FF2B5EF4-FFF2-40B4-BE49-F238E27FC236}">
+                <a16:creationId xmlns:a16="http://schemas.microsoft.com/office/drawing/2014/main" id="{C9D12473-D1B0-4DC2-BA0A-4DA10EAC4D8E}"/>
+              </a:ext>
+            </a:extLst>
+          </p:cNvPr>
+          <p:cNvSpPr txBox="1"/>
+          <p:nvPr/>
+        </p:nvSpPr>
+        <p:spPr>
+          <a:xfrm>
+            <a:off x="3031047" y="2227804"/>
+            <a:ext cx="2291546" cy="489365"/>
+          </a:xfrm>
+          <a:prstGeom prst="rect">
+            <a:avLst/>
+          </a:prstGeom>
+          <a:noFill/>
+        </p:spPr>
+        <p:txBody>
+          <a:bodyPr wrap="square" lIns="182880" tIns="146304" rIns="182880" bIns="146304" rtlCol="0">
+            <a:spAutoFit/>
+          </a:bodyPr>
+          <a:lstStyle/>
+          <a:p>
+            <a:pPr algn="r">
+              <a:lnSpc>
+                <a:spcPct val="90000"/>
+              </a:lnSpc>
+              <a:spcAft>
+                <a:spcPts val="600"/>
+              </a:spcAft>
+            </a:pPr>
+            <a:r>
+              <a:rPr lang="en-US" sz="1400" dirty="0">
+                <a:gradFill>
+                  <a:gsLst>
+                    <a:gs pos="2917">
+                      <a:schemeClr val="tx1"/>
+                    </a:gs>
+                    <a:gs pos="30000">
+                      <a:schemeClr val="tx1"/>
+                    </a:gs>
+                  </a:gsLst>
+                  <a:lin ang="5400000" scaled="0"/>
+                </a:gradFill>
+              </a:rPr>
+              <a:t>  LONG TERM STORAGE</a:t>
+            </a:r>
+          </a:p>
+        </p:txBody>
+      </p:sp>
+      <p:sp>
+        <p:nvSpPr>
+          <p:cNvPr id="305" name="TextBox 304">
+            <a:extLst>
+              <a:ext uri="{FF2B5EF4-FFF2-40B4-BE49-F238E27FC236}">
+                <a16:creationId xmlns:a16="http://schemas.microsoft.com/office/drawing/2014/main" id="{A5710C37-3140-4C15-81EB-E119735C9498}"/>
+              </a:ext>
+            </a:extLst>
+          </p:cNvPr>
+          <p:cNvSpPr txBox="1"/>
+          <p:nvPr/>
+        </p:nvSpPr>
+        <p:spPr>
+          <a:xfrm>
+            <a:off x="8014231" y="2870431"/>
+            <a:ext cx="2364622" cy="489365"/>
+          </a:xfrm>
+          <a:prstGeom prst="rect">
+            <a:avLst/>
+          </a:prstGeom>
+          <a:noFill/>
+        </p:spPr>
+        <p:txBody>
+          <a:bodyPr wrap="none" lIns="182880" tIns="146304" rIns="182880" bIns="146304" rtlCol="0">
+            <a:spAutoFit/>
+          </a:bodyPr>
+          <a:lstStyle/>
+          <a:p>
+            <a:pPr algn="r">
+              <a:lnSpc>
+                <a:spcPct val="90000"/>
+              </a:lnSpc>
+              <a:spcAft>
+                <a:spcPts val="600"/>
+              </a:spcAft>
+            </a:pPr>
+            <a:r>
+              <a:rPr lang="en-US" sz="1400" dirty="0">
+                <a:gradFill>
+                  <a:gsLst>
+                    <a:gs pos="2917">
+                      <a:schemeClr val="tx1"/>
+                    </a:gs>
+                    <a:gs pos="30000">
+                      <a:schemeClr val="tx1"/>
+                    </a:gs>
+                  </a:gsLst>
+                  <a:lin ang="5400000" scaled="0"/>
+                </a:gradFill>
+              </a:rPr>
+              <a:t>STREAM DATA PROCESSING</a:t>
+            </a:r>
+          </a:p>
+        </p:txBody>
+      </p:sp>
+      <p:grpSp>
+        <p:nvGrpSpPr>
+          <p:cNvPr id="4" name="Group 3">
+            <a:extLst>
+              <a:ext uri="{FF2B5EF4-FFF2-40B4-BE49-F238E27FC236}">
+                <a16:creationId xmlns:a16="http://schemas.microsoft.com/office/drawing/2014/main" id="{1287115E-B37E-46FF-87C4-D3EC3236FDAE}"/>
+              </a:ext>
+            </a:extLst>
+          </p:cNvPr>
+          <p:cNvGrpSpPr/>
+          <p:nvPr/>
+        </p:nvGrpSpPr>
+        <p:grpSpPr>
+          <a:xfrm>
+            <a:off x="3978175" y="2718189"/>
+            <a:ext cx="734502" cy="1075195"/>
+            <a:chOff x="3078067" y="3561533"/>
+            <a:chExt cx="734502" cy="1075195"/>
+          </a:xfrm>
+        </p:grpSpPr>
+        <p:sp>
+          <p:nvSpPr>
+            <p:cNvPr id="75" name="TextBox 74">
+              <a:extLst>
+                <a:ext uri="{FF2B5EF4-FFF2-40B4-BE49-F238E27FC236}">
+                  <a16:creationId xmlns:a16="http://schemas.microsoft.com/office/drawing/2014/main" id="{72A2A260-5FFB-4BD1-939A-0087CFA3585F}"/>
+                </a:ext>
+              </a:extLst>
+            </p:cNvPr>
+            <p:cNvSpPr txBox="1"/>
+            <p:nvPr/>
+          </p:nvSpPr>
+          <p:spPr>
+            <a:xfrm>
+              <a:off x="3078067" y="4128897"/>
+              <a:ext cx="734502" cy="507831"/>
+            </a:xfrm>
+            <a:prstGeom prst="rect">
+              <a:avLst/>
+            </a:prstGeom>
+          </p:spPr>
+          <p:txBody>
+            <a:bodyPr wrap="square">
+              <a:spAutoFit/>
+            </a:bodyPr>
+            <a:lstStyle>
+              <a:defPPr>
+                <a:defRPr lang="en-US"/>
+              </a:defPPr>
+              <a:lvl1pPr defTabSz="950973">
+                <a:defRPr sz="900" kern="0">
+                  <a:latin typeface="Segoe UI Semibold" panose="020B0702040204020203" pitchFamily="34" charset="0"/>
+                  <a:ea typeface="MS PGothic" panose="020B0600070205080204" pitchFamily="34" charset="-128"/>
+                  <a:cs typeface="Segoe UI Semibold" panose="020B0702040204020203" pitchFamily="34" charset="0"/>
+                </a:defRPr>
+              </a:lvl1pPr>
+            </a:lstStyle>
+            <a:p>
+              <a:pPr algn="ctr"/>
+              <a:r>
+                <a:rPr lang="en-US" dirty="0"/>
+                <a:t>Azure Blob Storage</a:t>
+              </a:r>
+            </a:p>
+          </p:txBody>
+        </p:sp>
+        <p:pic>
+          <p:nvPicPr>
+            <p:cNvPr id="40" name="Picture 26" descr="Image result for Azure Blob Storage icon">
+              <a:extLst>
+                <a:ext uri="{FF2B5EF4-FFF2-40B4-BE49-F238E27FC236}">
+                  <a16:creationId xmlns:a16="http://schemas.microsoft.com/office/drawing/2014/main" id="{2C69B5E3-96FB-4409-9AB9-E2340AAA2A99}"/>
+                </a:ext>
+              </a:extLst>
+            </p:cNvPr>
+            <p:cNvPicPr>
+              <a:picLocks noChangeAspect="1" noChangeArrowheads="1"/>
+            </p:cNvPicPr>
+            <p:nvPr/>
+          </p:nvPicPr>
+          <p:blipFill>
+            <a:blip r:embed="rId5" cstate="print">
+              <a:extLst>
+                <a:ext uri="{28A0092B-C50C-407E-A947-70E740481C1C}">
+                  <a14:useLocalDpi xmlns:a14="http://schemas.microsoft.com/office/drawing/2010/main" val="0"/>
+                </a:ext>
+              </a:extLst>
+            </a:blip>
+            <a:stretch>
+              <a:fillRect/>
+            </a:stretch>
+          </p:blipFill>
+          <p:spPr bwMode="auto">
+            <a:xfrm>
+              <a:off x="3202250" y="3561533"/>
+              <a:ext cx="475488" cy="475488"/>
+            </a:xfrm>
+            <a:prstGeom prst="rect">
+              <a:avLst/>
+            </a:prstGeom>
+            <a:noFill/>
+            <a:extLst>
+              <a:ext uri="{909E8E84-426E-40DD-AFC4-6F175D3DCCD1}">
+                <a14:hiddenFill xmlns:a14="http://schemas.microsoft.com/office/drawing/2010/main">
+                  <a:solidFill>
+                    <a:srgbClr val="FFFFFF"/>
+                  </a:solidFill>
+                </a14:hiddenFill>
+              </a:ext>
+            </a:extLst>
+          </p:spPr>
+        </p:pic>
+      </p:grpSp>
+      <p:sp>
+        <p:nvSpPr>
+          <p:cNvPr id="59" name="TextBox 58">
+            <a:extLst>
+              <a:ext uri="{FF2B5EF4-FFF2-40B4-BE49-F238E27FC236}">
+                <a16:creationId xmlns:a16="http://schemas.microsoft.com/office/drawing/2014/main" id="{B723EFC5-6988-4E8A-BF81-DC1937934AC5}"/>
+              </a:ext>
+            </a:extLst>
+          </p:cNvPr>
+          <p:cNvSpPr txBox="1"/>
+          <p:nvPr/>
+        </p:nvSpPr>
+        <p:spPr>
+          <a:xfrm>
+            <a:off x="7694391" y="1254096"/>
+            <a:ext cx="949633" cy="663442"/>
+          </a:xfrm>
+          <a:prstGeom prst="rect">
+            <a:avLst/>
+          </a:prstGeom>
+          <a:noFill/>
+        </p:spPr>
+        <p:txBody>
+          <a:bodyPr wrap="square" lIns="91440" tIns="143347" rIns="91440" bIns="143347" rtlCol="0">
+            <a:spAutoFit/>
+          </a:bodyPr>
+          <a:lstStyle>
+            <a:defPPr>
+              <a:defRPr lang="en-US"/>
+            </a:defPPr>
+            <a:lvl1pPr defTabSz="913781">
+              <a:lnSpc>
+                <a:spcPct val="90000"/>
+              </a:lnSpc>
+              <a:spcBef>
+                <a:spcPct val="0"/>
+              </a:spcBef>
+              <a:spcAft>
+                <a:spcPts val="588"/>
+              </a:spcAft>
+              <a:defRPr sz="1125" kern="0" spc="-29">
+                <a:gradFill>
+                  <a:gsLst>
+                    <a:gs pos="1250">
+                      <a:schemeClr val="tx1"/>
+                    </a:gs>
+                    <a:gs pos="100000">
+                      <a:schemeClr val="tx1"/>
+                    </a:gs>
+                  </a:gsLst>
+                  <a:lin ang="5400000" scaled="0"/>
+                </a:gradFill>
+                <a:latin typeface="Segoe UI Semilight" panose="020B0402040204020203" pitchFamily="34" charset="0"/>
+                <a:ea typeface="MS PGothic" panose="020B0600070205080204" pitchFamily="34" charset="-128"/>
+                <a:cs typeface="Segoe UI Semilight" panose="020B0402040204020203" pitchFamily="34" charset="0"/>
+              </a:defRPr>
+            </a:lvl1pPr>
+            <a:lvl2pPr>
+              <a:defRPr>
+                <a:solidFill>
+                  <a:schemeClr val="tx1"/>
+                </a:solidFill>
+              </a:defRPr>
+            </a:lvl2pPr>
+            <a:lvl3pPr>
+              <a:defRPr>
+                <a:solidFill>
+                  <a:schemeClr val="tx1"/>
+                </a:solidFill>
+              </a:defRPr>
+            </a:lvl3pPr>
+            <a:lvl4pPr>
+              <a:defRPr>
+                <a:solidFill>
+                  <a:schemeClr val="tx1"/>
+                </a:solidFill>
+              </a:defRPr>
+            </a:lvl4pPr>
+            <a:lvl5pPr>
+              <a:defRPr>
+                <a:solidFill>
+                  <a:schemeClr val="tx1"/>
+                </a:solidFill>
+              </a:defRPr>
+            </a:lvl5pPr>
+            <a:lvl6pPr>
+              <a:defRPr>
+                <a:solidFill>
+                  <a:schemeClr val="tx1"/>
+                </a:solidFill>
+              </a:defRPr>
+            </a:lvl6pPr>
+            <a:lvl7pPr>
+              <a:defRPr>
+                <a:solidFill>
+                  <a:schemeClr val="tx1"/>
+                </a:solidFill>
+              </a:defRPr>
+            </a:lvl7pPr>
+            <a:lvl8pPr>
+              <a:defRPr>
+                <a:solidFill>
+                  <a:schemeClr val="tx1"/>
+                </a:solidFill>
+              </a:defRPr>
+            </a:lvl8pPr>
+            <a:lvl9pPr>
+              <a:defRPr>
+                <a:solidFill>
+                  <a:schemeClr val="tx1"/>
+                </a:solidFill>
+              </a:defRPr>
+            </a:lvl9pPr>
+          </a:lstStyle>
+          <a:p>
+            <a:pPr algn="ctr"/>
+            <a:r>
+              <a:rPr lang="en-US" sz="900" dirty="0">
+                <a:solidFill>
+                  <a:schemeClr val="tx1"/>
+                </a:solidFill>
+                <a:latin typeface="Segoe UI Semibold" panose="020B0702040204020203" pitchFamily="34" charset="0"/>
+                <a:cs typeface="Segoe UI Semibold" panose="020B0702040204020203" pitchFamily="34" charset="0"/>
+              </a:rPr>
+              <a:t>Azure Machine Learning Workspace  </a:t>
+            </a:r>
+          </a:p>
+        </p:txBody>
+      </p:sp>
+      <p:grpSp>
+        <p:nvGrpSpPr>
+          <p:cNvPr id="3" name="Group 2">
+            <a:extLst>
+              <a:ext uri="{FF2B5EF4-FFF2-40B4-BE49-F238E27FC236}">
+                <a16:creationId xmlns:a16="http://schemas.microsoft.com/office/drawing/2014/main" id="{EBE3687E-6C1C-47CC-B7EC-6F207BB0ECEF}"/>
+              </a:ext>
+            </a:extLst>
+          </p:cNvPr>
+          <p:cNvGrpSpPr/>
+          <p:nvPr/>
+        </p:nvGrpSpPr>
+        <p:grpSpPr>
+          <a:xfrm>
+            <a:off x="4854751" y="912993"/>
+            <a:ext cx="1244733" cy="1448795"/>
+            <a:chOff x="5397668" y="1651555"/>
+            <a:chExt cx="1244733" cy="1448795"/>
+          </a:xfrm>
+        </p:grpSpPr>
+        <p:pic>
+          <p:nvPicPr>
+            <p:cNvPr id="270" name="Picture 269">
+              <a:extLst>
+                <a:ext uri="{FF2B5EF4-FFF2-40B4-BE49-F238E27FC236}">
+                  <a16:creationId xmlns:a16="http://schemas.microsoft.com/office/drawing/2014/main" id="{C35B6837-FAFB-4B91-8B8D-99B09C116E6E}"/>
+                </a:ext>
+              </a:extLst>
+            </p:cNvPr>
+            <p:cNvPicPr>
+              <a:picLocks noChangeAspect="1"/>
+            </p:cNvPicPr>
+            <p:nvPr/>
+          </p:nvPicPr>
+          <p:blipFill>
+            <a:blip r:embed="rId3">
+              <a:extLst>
+                <a:ext uri="{96DAC541-7B7A-43D3-8B79-37D633B846F1}">
+                  <asvg:svgBlip xmlns:asvg="http://schemas.microsoft.com/office/drawing/2016/SVG/main" r:embed="rId4"/>
+                </a:ext>
+              </a:extLst>
+            </a:blip>
+            <a:stretch>
+              <a:fillRect/>
+            </a:stretch>
+          </p:blipFill>
+          <p:spPr>
+            <a:xfrm>
+              <a:off x="5754690" y="1651555"/>
+              <a:ext cx="647646" cy="647646"/>
+            </a:xfrm>
+            <a:prstGeom prst="rect">
+              <a:avLst/>
+            </a:prstGeom>
+          </p:spPr>
+        </p:pic>
+        <p:sp>
+          <p:nvSpPr>
+            <p:cNvPr id="160" name="TextBox 159">
+              <a:extLst>
+                <a:ext uri="{FF2B5EF4-FFF2-40B4-BE49-F238E27FC236}">
+                  <a16:creationId xmlns:a16="http://schemas.microsoft.com/office/drawing/2014/main" id="{7D05A728-7162-4E08-8398-215FA88D9256}"/>
+                </a:ext>
+              </a:extLst>
+            </p:cNvPr>
+            <p:cNvSpPr txBox="1"/>
+            <p:nvPr/>
+          </p:nvSpPr>
+          <p:spPr>
+            <a:xfrm>
+              <a:off x="5397668" y="2187609"/>
+              <a:ext cx="1244733" cy="912741"/>
+            </a:xfrm>
+            <a:prstGeom prst="rect">
+              <a:avLst/>
+            </a:prstGeom>
+            <a:noFill/>
+          </p:spPr>
+          <p:txBody>
+            <a:bodyPr wrap="square" lIns="91440" tIns="143347" rIns="91440" bIns="143347" rtlCol="0">
+              <a:spAutoFit/>
+            </a:bodyPr>
+            <a:lstStyle>
+              <a:defPPr>
+                <a:defRPr lang="en-US"/>
+              </a:defPPr>
+              <a:lvl1pPr defTabSz="913781">
+                <a:lnSpc>
+                  <a:spcPct val="90000"/>
+                </a:lnSpc>
+                <a:spcBef>
+                  <a:spcPct val="0"/>
+                </a:spcBef>
+                <a:spcAft>
+                  <a:spcPts val="588"/>
+                </a:spcAft>
+                <a:defRPr sz="1125" kern="0" spc="-29">
+                  <a:gradFill>
+                    <a:gsLst>
+                      <a:gs pos="1250">
+                        <a:schemeClr val="tx1"/>
+                      </a:gs>
+                      <a:gs pos="100000">
+                        <a:schemeClr val="tx1"/>
+                      </a:gs>
+                    </a:gsLst>
+                    <a:lin ang="5400000" scaled="0"/>
+                  </a:gradFill>
+                  <a:latin typeface="Segoe UI Semilight" panose="020B0402040204020203" pitchFamily="34" charset="0"/>
+                  <a:ea typeface="MS PGothic" panose="020B0600070205080204" pitchFamily="34" charset="-128"/>
+                  <a:cs typeface="Segoe UI Semilight" panose="020B0402040204020203" pitchFamily="34" charset="0"/>
+                </a:defRPr>
+              </a:lvl1pPr>
+              <a:lvl2pPr>
+                <a:defRPr>
+                  <a:solidFill>
+                    <a:schemeClr val="tx1"/>
+                  </a:solidFill>
+                </a:defRPr>
+              </a:lvl2pPr>
+              <a:lvl3pPr>
+                <a:defRPr>
+                  <a:solidFill>
+                    <a:schemeClr val="tx1"/>
+                  </a:solidFill>
+                </a:defRPr>
+              </a:lvl3pPr>
+              <a:lvl4pPr>
+                <a:defRPr>
+                  <a:solidFill>
+                    <a:schemeClr val="tx1"/>
+                  </a:solidFill>
+                </a:defRPr>
+              </a:lvl4pPr>
+              <a:lvl5pPr>
+                <a:defRPr>
+                  <a:solidFill>
+                    <a:schemeClr val="tx1"/>
+                  </a:solidFill>
+                </a:defRPr>
+              </a:lvl5pPr>
+              <a:lvl6pPr>
+                <a:defRPr>
+                  <a:solidFill>
+                    <a:schemeClr val="tx1"/>
+                  </a:solidFill>
+                </a:defRPr>
+              </a:lvl6pPr>
+              <a:lvl7pPr>
+                <a:defRPr>
+                  <a:solidFill>
+                    <a:schemeClr val="tx1"/>
+                  </a:solidFill>
+                </a:defRPr>
+              </a:lvl7pPr>
+              <a:lvl8pPr>
+                <a:defRPr>
+                  <a:solidFill>
+                    <a:schemeClr val="tx1"/>
+                  </a:solidFill>
+                </a:defRPr>
+              </a:lvl8pPr>
+              <a:lvl9pPr>
+                <a:defRPr>
+                  <a:solidFill>
+                    <a:schemeClr val="tx1"/>
+                  </a:solidFill>
+                </a:defRPr>
+              </a:lvl9pPr>
+            </a:lstStyle>
+            <a:p>
+              <a:pPr algn="ctr">
+                <a:spcAft>
+                  <a:spcPts val="0"/>
+                </a:spcAft>
+              </a:pPr>
+              <a:r>
+                <a:rPr lang="en-US" sz="900" dirty="0">
+                  <a:solidFill>
+                    <a:schemeClr val="tx1"/>
+                  </a:solidFill>
+                  <a:latin typeface="Segoe UI Semibold" panose="020B0702040204020203" pitchFamily="34" charset="0"/>
+                  <a:cs typeface="Segoe UI Semibold" panose="020B0702040204020203" pitchFamily="34" charset="0"/>
+                </a:rPr>
+                <a:t>Azure Databricks</a:t>
+              </a:r>
+            </a:p>
+            <a:p>
+              <a:pPr algn="ctr">
+                <a:spcAft>
+                  <a:spcPts val="0"/>
+                </a:spcAft>
+              </a:pPr>
+              <a:r>
+                <a:rPr lang="en-US" sz="900" dirty="0">
+                  <a:solidFill>
+                    <a:schemeClr val="tx1"/>
+                  </a:solidFill>
+                  <a:latin typeface="Segoe UI Semibold" panose="020B0702040204020203" pitchFamily="34" charset="0"/>
+                  <a:cs typeface="Segoe UI Semibold" panose="020B0702040204020203" pitchFamily="34" charset="0"/>
+                </a:rPr>
+                <a:t>Data Cleansing and Preparation</a:t>
+              </a:r>
+            </a:p>
+            <a:p>
+              <a:pPr algn="ctr">
+                <a:spcAft>
+                  <a:spcPts val="0"/>
+                </a:spcAft>
+              </a:pPr>
+              <a:r>
+                <a:rPr lang="en-US" sz="900" dirty="0">
+                  <a:solidFill>
+                    <a:schemeClr val="tx1"/>
+                  </a:solidFill>
+                  <a:latin typeface="Segoe UI Semibold" panose="020B0702040204020203" pitchFamily="34" charset="0"/>
+                  <a:cs typeface="Segoe UI Semibold" panose="020B0702040204020203" pitchFamily="34" charset="0"/>
+                </a:rPr>
+                <a:t>Model Training</a:t>
+              </a:r>
+              <a:br>
+                <a:rPr lang="en-US" sz="900" dirty="0">
+                  <a:solidFill>
+                    <a:schemeClr val="tx1"/>
+                  </a:solidFill>
+                  <a:latin typeface="Segoe UI Semibold" panose="020B0702040204020203" pitchFamily="34" charset="0"/>
+                  <a:cs typeface="Segoe UI Semibold" panose="020B0702040204020203" pitchFamily="34" charset="0"/>
+                </a:rPr>
+              </a:br>
+              <a:r>
+                <a:rPr lang="en-US" sz="900" dirty="0">
+                  <a:solidFill>
+                    <a:schemeClr val="tx1"/>
+                  </a:solidFill>
+                  <a:latin typeface="Segoe UI Semibold" panose="020B0702040204020203" pitchFamily="34" charset="0"/>
+                  <a:cs typeface="Segoe UI Semibold" panose="020B0702040204020203" pitchFamily="34" charset="0"/>
+                </a:rPr>
+                <a:t>(PyTorch &amp; Keras)</a:t>
+              </a:r>
+            </a:p>
+          </p:txBody>
+        </p:sp>
+      </p:grpSp>
+      <p:sp>
+        <p:nvSpPr>
+          <p:cNvPr id="239" name="Rectangle: Rounded Corners 238">
+            <a:extLst>
+              <a:ext uri="{FF2B5EF4-FFF2-40B4-BE49-F238E27FC236}">
+                <a16:creationId xmlns:a16="http://schemas.microsoft.com/office/drawing/2014/main" id="{BDDE372F-439E-40CA-A3EE-DDB183652366}"/>
+              </a:ext>
+            </a:extLst>
+          </p:cNvPr>
+          <p:cNvSpPr/>
+          <p:nvPr/>
+        </p:nvSpPr>
+        <p:spPr bwMode="auto">
+          <a:xfrm>
+            <a:off x="7260212" y="761452"/>
+            <a:ext cx="1805904" cy="1172575"/>
+          </a:xfrm>
+          <a:prstGeom prst="roundRect">
+            <a:avLst/>
+          </a:prstGeom>
+          <a:noFill/>
+          <a:ln>
+            <a:solidFill>
+              <a:srgbClr val="002060"/>
+            </a:solidFill>
+            <a:prstDash val="sysDash"/>
+            <a:headEnd type="none" w="med" len="med"/>
+            <a:tailEnd type="none" w="med" len="med"/>
+          </a:ln>
+          <a:effectLst/>
+        </p:spPr>
+        <p:style>
+          <a:lnRef idx="1">
+            <a:schemeClr val="accent2"/>
+          </a:lnRef>
+          <a:fillRef idx="3">
+            <a:schemeClr val="accent2"/>
+          </a:fillRef>
+          <a:effectRef idx="2">
+            <a:schemeClr val="accent2"/>
+          </a:effectRef>
+          <a:fontRef idx="minor">
+            <a:schemeClr val="lt1"/>
+          </a:fontRef>
+        </p:style>
+        <p:txBody>
+          <a:bodyPr rot="0" spcFirstLastPara="0" vertOverflow="overflow" horzOverflow="overflow" vert="horz" wrap="square" lIns="182880" tIns="146304" rIns="182880" bIns="146304" numCol="1" spcCol="0" rtlCol="0" fromWordArt="0" anchor="t" anchorCtr="0" forceAA="0" compatLnSpc="1">
+            <a:prstTxWarp prst="textNoShape">
+              <a:avLst/>
+            </a:prstTxWarp>
+            <a:noAutofit/>
+          </a:bodyPr>
+          <a:lstStyle/>
+          <a:p>
+            <a:pPr algn="ctr" defTabSz="932472" fontAlgn="base">
+              <a:lnSpc>
+                <a:spcPct val="90000"/>
+              </a:lnSpc>
+              <a:spcBef>
+                <a:spcPct val="0"/>
+              </a:spcBef>
+              <a:spcAft>
+                <a:spcPct val="0"/>
+              </a:spcAft>
+            </a:pPr>
+            <a:endParaRPr lang="en-US" sz="2400" dirty="0" err="1">
+              <a:gradFill>
+                <a:gsLst>
+                  <a:gs pos="0">
+                    <a:srgbClr val="FFFFFF"/>
+                  </a:gs>
+                  <a:gs pos="100000">
+                    <a:srgbClr val="FFFFFF"/>
+                  </a:gs>
+                </a:gsLst>
+                <a:lin ang="5400000" scaled="0"/>
+              </a:gradFill>
+              <a:ea typeface="Segoe UI" pitchFamily="34" charset="0"/>
+              <a:cs typeface="Segoe UI" pitchFamily="34" charset="0"/>
+            </a:endParaRPr>
+          </a:p>
+        </p:txBody>
+      </p:sp>
+      <p:sp>
+        <p:nvSpPr>
+          <p:cNvPr id="245" name="TextBox 244">
+            <a:extLst>
+              <a:ext uri="{FF2B5EF4-FFF2-40B4-BE49-F238E27FC236}">
+                <a16:creationId xmlns:a16="http://schemas.microsoft.com/office/drawing/2014/main" id="{99C7C64E-1E57-4B5B-8296-2E23AC0F6389}"/>
+              </a:ext>
+            </a:extLst>
+          </p:cNvPr>
+          <p:cNvSpPr txBox="1"/>
+          <p:nvPr/>
+        </p:nvSpPr>
+        <p:spPr>
+          <a:xfrm>
+            <a:off x="7062283" y="372617"/>
+            <a:ext cx="2079993" cy="489365"/>
+          </a:xfrm>
+          <a:prstGeom prst="rect">
+            <a:avLst/>
+          </a:prstGeom>
+          <a:noFill/>
+        </p:spPr>
+        <p:txBody>
+          <a:bodyPr wrap="none" lIns="182880" tIns="146304" rIns="182880" bIns="146304" rtlCol="0">
+            <a:spAutoFit/>
+          </a:bodyPr>
+          <a:lstStyle/>
+          <a:p>
+            <a:pPr algn="r">
+              <a:lnSpc>
+                <a:spcPct val="90000"/>
+              </a:lnSpc>
+              <a:spcAft>
+                <a:spcPts val="600"/>
+              </a:spcAft>
+            </a:pPr>
+            <a:r>
+              <a:rPr lang="en-US" sz="1400" dirty="0">
+                <a:gradFill>
+                  <a:gsLst>
+                    <a:gs pos="2917">
+                      <a:schemeClr val="tx1"/>
+                    </a:gs>
+                    <a:gs pos="30000">
+                      <a:schemeClr val="tx1"/>
+                    </a:gs>
+                  </a:gsLst>
+                  <a:lin ang="5400000" scaled="0"/>
+                </a:gradFill>
+              </a:rPr>
+              <a:t>MODEL MANAGEMENT</a:t>
+            </a:r>
+          </a:p>
+        </p:txBody>
+      </p:sp>
+      <p:grpSp>
+        <p:nvGrpSpPr>
+          <p:cNvPr id="11" name="Group 10">
+            <a:extLst>
+              <a:ext uri="{FF2B5EF4-FFF2-40B4-BE49-F238E27FC236}">
+                <a16:creationId xmlns:a16="http://schemas.microsoft.com/office/drawing/2014/main" id="{47A3350F-DE55-4808-9C56-13DF28DA5997}"/>
+              </a:ext>
+            </a:extLst>
+          </p:cNvPr>
+          <p:cNvGrpSpPr/>
+          <p:nvPr/>
+        </p:nvGrpSpPr>
+        <p:grpSpPr>
+          <a:xfrm>
+            <a:off x="239799" y="2709909"/>
+            <a:ext cx="1031051" cy="953179"/>
+            <a:chOff x="429200" y="2819807"/>
+            <a:chExt cx="1031051" cy="953179"/>
+          </a:xfrm>
+        </p:grpSpPr>
+        <p:sp>
+          <p:nvSpPr>
+            <p:cNvPr id="246" name="TextBox 245">
+              <a:extLst>
+                <a:ext uri="{FF2B5EF4-FFF2-40B4-BE49-F238E27FC236}">
+                  <a16:creationId xmlns:a16="http://schemas.microsoft.com/office/drawing/2014/main" id="{E88E97F0-91D0-450C-ABD1-D31E400A51E1}"/>
+                </a:ext>
+              </a:extLst>
+            </p:cNvPr>
+            <p:cNvSpPr txBox="1"/>
+            <p:nvPr/>
+          </p:nvSpPr>
+          <p:spPr>
+            <a:xfrm>
+              <a:off x="429200" y="3555106"/>
+              <a:ext cx="1031051" cy="217880"/>
+            </a:xfrm>
+            <a:prstGeom prst="rect">
+              <a:avLst/>
+            </a:prstGeom>
+            <a:noFill/>
+          </p:spPr>
+          <p:txBody>
+            <a:bodyPr wrap="none" lIns="91440" tIns="45720" rIns="91440" bIns="45720" rtlCol="0">
+              <a:spAutoFit/>
+            </a:bodyPr>
+            <a:lstStyle/>
+            <a:p>
+              <a:pPr algn="ctr" defTabSz="951156">
+                <a:defRPr/>
+              </a:pPr>
+              <a:r>
+                <a:rPr lang="en-US" sz="816" kern="0" dirty="0">
+                  <a:latin typeface="Segoe UI Semibold" panose="020B0702040204020203" pitchFamily="34" charset="0"/>
+                  <a:ea typeface="MS PGothic" panose="020B0600070205080204" pitchFamily="34" charset="-128"/>
+                  <a:cs typeface="Segoe UI Semibold" panose="020B0702040204020203" pitchFamily="34" charset="0"/>
+                </a:rPr>
+                <a:t>Battery Telemetry</a:t>
+              </a:r>
+            </a:p>
+          </p:txBody>
+        </p:sp>
+        <p:pic>
+          <p:nvPicPr>
+            <p:cNvPr id="10" name="Graphic 9" descr="Car">
+              <a:extLst>
+                <a:ext uri="{FF2B5EF4-FFF2-40B4-BE49-F238E27FC236}">
+                  <a16:creationId xmlns:a16="http://schemas.microsoft.com/office/drawing/2014/main" id="{70959A40-D1B2-46A7-B1D6-6F3AA1B06B18}"/>
+                </a:ext>
+              </a:extLst>
+            </p:cNvPr>
+            <p:cNvPicPr>
+              <a:picLocks noChangeAspect="1"/>
+            </p:cNvPicPr>
+            <p:nvPr/>
+          </p:nvPicPr>
+          <p:blipFill>
+            <a:blip r:embed="rId6">
+              <a:extLst>
+                <a:ext uri="{28A0092B-C50C-407E-A947-70E740481C1C}">
+                  <a14:useLocalDpi xmlns:a14="http://schemas.microsoft.com/office/drawing/2010/main" val="0"/>
+                </a:ext>
+                <a:ext uri="{96DAC541-7B7A-43D3-8B79-37D633B846F1}">
+                  <asvg:svgBlip xmlns:asvg="http://schemas.microsoft.com/office/drawing/2016/SVG/main" r:embed="rId7"/>
+                </a:ext>
+              </a:extLst>
+            </a:blip>
+            <a:stretch>
+              <a:fillRect/>
+            </a:stretch>
+          </p:blipFill>
+          <p:spPr>
+            <a:xfrm>
+              <a:off x="467424" y="2819807"/>
+              <a:ext cx="914400" cy="914400"/>
+            </a:xfrm>
+            <a:prstGeom prst="rect">
+              <a:avLst/>
+            </a:prstGeom>
+          </p:spPr>
+        </p:pic>
+      </p:grpSp>
+      <p:sp>
+        <p:nvSpPr>
+          <p:cNvPr id="274" name="Rectangle: Rounded Corners 273">
+            <a:extLst>
+              <a:ext uri="{FF2B5EF4-FFF2-40B4-BE49-F238E27FC236}">
+                <a16:creationId xmlns:a16="http://schemas.microsoft.com/office/drawing/2014/main" id="{FA6028C9-F5D3-417E-81D4-4594A2F28B57}"/>
+              </a:ext>
+            </a:extLst>
+          </p:cNvPr>
+          <p:cNvSpPr/>
+          <p:nvPr/>
+        </p:nvSpPr>
+        <p:spPr bwMode="auto">
+          <a:xfrm>
+            <a:off x="1602287" y="2605164"/>
+            <a:ext cx="1147765" cy="1152144"/>
+          </a:xfrm>
+          <a:prstGeom prst="roundRect">
+            <a:avLst/>
+          </a:prstGeom>
+          <a:noFill/>
+          <a:ln>
+            <a:solidFill>
+              <a:srgbClr val="002060"/>
+            </a:solidFill>
+            <a:prstDash val="sysDash"/>
+            <a:headEnd type="none" w="med" len="med"/>
+            <a:tailEnd type="none" w="med" len="med"/>
+          </a:ln>
+          <a:effectLst/>
+        </p:spPr>
+        <p:style>
+          <a:lnRef idx="1">
+            <a:schemeClr val="accent2"/>
+          </a:lnRef>
+          <a:fillRef idx="3">
+            <a:schemeClr val="accent2"/>
+          </a:fillRef>
+          <a:effectRef idx="2">
+            <a:schemeClr val="accent2"/>
+          </a:effectRef>
+          <a:fontRef idx="minor">
+            <a:schemeClr val="lt1"/>
+          </a:fontRef>
+        </p:style>
+        <p:txBody>
+          <a:bodyPr rot="0" spcFirstLastPara="0" vertOverflow="overflow" horzOverflow="overflow" vert="horz" wrap="square" lIns="182880" tIns="146304" rIns="182880" bIns="146304" numCol="1" spcCol="0" rtlCol="0" fromWordArt="0" anchor="t" anchorCtr="0" forceAA="0" compatLnSpc="1">
+            <a:prstTxWarp prst="textNoShape">
+              <a:avLst/>
+            </a:prstTxWarp>
+            <a:noAutofit/>
+          </a:bodyPr>
+          <a:lstStyle/>
+          <a:p>
+            <a:pPr algn="ctr" defTabSz="932472" fontAlgn="base">
+              <a:lnSpc>
+                <a:spcPct val="90000"/>
+              </a:lnSpc>
+              <a:spcBef>
+                <a:spcPct val="0"/>
+              </a:spcBef>
+              <a:spcAft>
+                <a:spcPct val="0"/>
+              </a:spcAft>
+            </a:pPr>
+            <a:endParaRPr lang="en-US" sz="2400" dirty="0" err="1">
+              <a:gradFill>
+                <a:gsLst>
+                  <a:gs pos="0">
+                    <a:srgbClr val="FFFFFF"/>
+                  </a:gs>
+                  <a:gs pos="100000">
+                    <a:srgbClr val="FFFFFF"/>
+                  </a:gs>
+                </a:gsLst>
+                <a:lin ang="5400000" scaled="0"/>
+              </a:gradFill>
+              <a:ea typeface="Segoe UI" pitchFamily="34" charset="0"/>
+              <a:cs typeface="Segoe UI" pitchFamily="34" charset="0"/>
+            </a:endParaRPr>
+          </a:p>
+        </p:txBody>
+      </p:sp>
+      <p:sp>
+        <p:nvSpPr>
+          <p:cNvPr id="275" name="TextBox 274">
+            <a:extLst>
+              <a:ext uri="{FF2B5EF4-FFF2-40B4-BE49-F238E27FC236}">
+                <a16:creationId xmlns:a16="http://schemas.microsoft.com/office/drawing/2014/main" id="{F6D851C9-1EED-4635-A079-0EC1E3C5EBDA}"/>
+              </a:ext>
+            </a:extLst>
+          </p:cNvPr>
+          <p:cNvSpPr txBox="1"/>
+          <p:nvPr/>
+        </p:nvSpPr>
+        <p:spPr>
+          <a:xfrm>
+            <a:off x="1548980" y="2226774"/>
+            <a:ext cx="1203650" cy="489365"/>
+          </a:xfrm>
+          <a:prstGeom prst="rect">
+            <a:avLst/>
+          </a:prstGeom>
+          <a:noFill/>
+        </p:spPr>
+        <p:txBody>
+          <a:bodyPr wrap="square" lIns="182880" tIns="146304" rIns="182880" bIns="146304" rtlCol="0">
+            <a:spAutoFit/>
+          </a:bodyPr>
+          <a:lstStyle/>
+          <a:p>
+            <a:pPr algn="r">
+              <a:lnSpc>
+                <a:spcPct val="90000"/>
+              </a:lnSpc>
+              <a:spcAft>
+                <a:spcPts val="600"/>
+              </a:spcAft>
+            </a:pPr>
+            <a:r>
+              <a:rPr lang="en-US" sz="1400" dirty="0">
+                <a:gradFill>
+                  <a:gsLst>
+                    <a:gs pos="2917">
+                      <a:schemeClr val="tx1"/>
+                    </a:gs>
+                    <a:gs pos="30000">
+                      <a:schemeClr val="tx1"/>
+                    </a:gs>
+                  </a:gsLst>
+                  <a:lin ang="5400000" scaled="0"/>
+                </a:gradFill>
+              </a:rPr>
+              <a:t>  INGEST</a:t>
+            </a:r>
+          </a:p>
+        </p:txBody>
+      </p:sp>
+      <p:grpSp>
+        <p:nvGrpSpPr>
+          <p:cNvPr id="278" name="Group 277">
+            <a:extLst>
+              <a:ext uri="{FF2B5EF4-FFF2-40B4-BE49-F238E27FC236}">
+                <a16:creationId xmlns:a16="http://schemas.microsoft.com/office/drawing/2014/main" id="{6B508508-FFE5-4E48-B0FE-26A40C734860}"/>
+              </a:ext>
+            </a:extLst>
+          </p:cNvPr>
+          <p:cNvGrpSpPr/>
+          <p:nvPr/>
+        </p:nvGrpSpPr>
+        <p:grpSpPr>
+          <a:xfrm>
+            <a:off x="1832087" y="2669531"/>
+            <a:ext cx="734502" cy="798196"/>
+            <a:chOff x="3078067" y="3561533"/>
+            <a:chExt cx="734502" cy="798196"/>
+          </a:xfrm>
+        </p:grpSpPr>
+        <p:sp>
+          <p:nvSpPr>
+            <p:cNvPr id="279" name="TextBox 278">
+              <a:extLst>
+                <a:ext uri="{FF2B5EF4-FFF2-40B4-BE49-F238E27FC236}">
+                  <a16:creationId xmlns:a16="http://schemas.microsoft.com/office/drawing/2014/main" id="{7129011D-30B9-469B-B158-C416F7CCB007}"/>
+                </a:ext>
+              </a:extLst>
+            </p:cNvPr>
+            <p:cNvSpPr txBox="1"/>
+            <p:nvPr/>
+          </p:nvSpPr>
+          <p:spPr>
+            <a:xfrm>
+              <a:off x="3078067" y="4128897"/>
+              <a:ext cx="734502" cy="230832"/>
+            </a:xfrm>
+            <a:prstGeom prst="rect">
+              <a:avLst/>
+            </a:prstGeom>
+          </p:spPr>
+          <p:txBody>
+            <a:bodyPr wrap="square">
+              <a:spAutoFit/>
+            </a:bodyPr>
+            <a:lstStyle>
+              <a:defPPr>
+                <a:defRPr lang="en-US"/>
+              </a:defPPr>
+              <a:lvl1pPr defTabSz="950973">
+                <a:defRPr sz="900" kern="0">
+                  <a:latin typeface="Segoe UI Semibold" panose="020B0702040204020203" pitchFamily="34" charset="0"/>
+                  <a:ea typeface="MS PGothic" panose="020B0600070205080204" pitchFamily="34" charset="-128"/>
+                  <a:cs typeface="Segoe UI Semibold" panose="020B0702040204020203" pitchFamily="34" charset="0"/>
+                </a:defRPr>
+              </a:lvl1pPr>
+            </a:lstStyle>
+            <a:p>
+              <a:pPr algn="ctr"/>
+              <a:r>
+                <a:rPr lang="en-US" dirty="0"/>
+                <a:t>IoT Hub</a:t>
+              </a:r>
+            </a:p>
+          </p:txBody>
+        </p:sp>
+        <p:pic>
+          <p:nvPicPr>
+            <p:cNvPr id="280" name="Picture 26">
+              <a:extLst>
+                <a:ext uri="{FF2B5EF4-FFF2-40B4-BE49-F238E27FC236}">
+                  <a16:creationId xmlns:a16="http://schemas.microsoft.com/office/drawing/2014/main" id="{41ED781E-27C3-45E9-A1CF-C460613AA563}"/>
+                </a:ext>
+              </a:extLst>
+            </p:cNvPr>
+            <p:cNvPicPr>
+              <a:picLocks noChangeAspect="1" noChangeArrowheads="1"/>
+            </p:cNvPicPr>
+            <p:nvPr/>
+          </p:nvPicPr>
+          <p:blipFill>
+            <a:blip r:embed="rId8">
+              <a:extLst>
+                <a:ext uri="{28A0092B-C50C-407E-A947-70E740481C1C}">
+                  <a14:useLocalDpi xmlns:a14="http://schemas.microsoft.com/office/drawing/2010/main" val="0"/>
+                </a:ext>
+              </a:extLst>
+            </a:blip>
+            <a:stretch>
+              <a:fillRect/>
+            </a:stretch>
+          </p:blipFill>
+          <p:spPr bwMode="auto">
+            <a:xfrm>
+              <a:off x="3202250" y="3561533"/>
+              <a:ext cx="475488" cy="475488"/>
+            </a:xfrm>
+            <a:prstGeom prst="rect">
+              <a:avLst/>
+            </a:prstGeom>
+            <a:noFill/>
+            <a:extLst>
+              <a:ext uri="{909E8E84-426E-40DD-AFC4-6F175D3DCCD1}">
+                <a14:hiddenFill xmlns:a14="http://schemas.microsoft.com/office/drawing/2010/main">
+                  <a:solidFill>
+                    <a:srgbClr val="FFFFFF"/>
+                  </a:solidFill>
+                </a14:hiddenFill>
+              </a:ext>
+            </a:extLst>
+          </p:spPr>
+        </p:pic>
+      </p:grpSp>
+      <p:cxnSp>
+        <p:nvCxnSpPr>
+          <p:cNvPr id="281" name="Straight Arrow Connector 280">
+            <a:extLst>
+              <a:ext uri="{FF2B5EF4-FFF2-40B4-BE49-F238E27FC236}">
+                <a16:creationId xmlns:a16="http://schemas.microsoft.com/office/drawing/2014/main" id="{85972865-81A2-4ECB-947A-6977F81C7499}"/>
+              </a:ext>
+            </a:extLst>
+          </p:cNvPr>
+          <p:cNvCxnSpPr>
+            <a:cxnSpLocks/>
+            <a:stCxn id="274" idx="3"/>
+            <a:endCxn id="15" idx="1"/>
+          </p:cNvCxnSpPr>
+          <p:nvPr/>
+        </p:nvCxnSpPr>
+        <p:spPr>
+          <a:xfrm>
+            <a:off x="2750052" y="3181236"/>
+            <a:ext cx="696414" cy="1030"/>
+          </a:xfrm>
+          <a:prstGeom prst="straightConnector1">
+            <a:avLst/>
+          </a:prstGeom>
+          <a:ln>
+            <a:tailEnd type="triangle"/>
+          </a:ln>
+        </p:spPr>
+        <p:style>
+          <a:lnRef idx="1">
+            <a:schemeClr val="accent1"/>
+          </a:lnRef>
+          <a:fillRef idx="0">
+            <a:schemeClr val="accent1"/>
+          </a:fillRef>
+          <a:effectRef idx="0">
+            <a:schemeClr val="accent1"/>
+          </a:effectRef>
+          <a:fontRef idx="minor">
+            <a:schemeClr val="tx1"/>
+          </a:fontRef>
+        </p:style>
+      </p:cxnSp>
+      <p:cxnSp>
+        <p:nvCxnSpPr>
+          <p:cNvPr id="282" name="Straight Arrow Connector 281">
+            <a:extLst>
+              <a:ext uri="{FF2B5EF4-FFF2-40B4-BE49-F238E27FC236}">
+                <a16:creationId xmlns:a16="http://schemas.microsoft.com/office/drawing/2014/main" id="{E0B5D460-6952-4799-BDBA-D9DC710118A9}"/>
+              </a:ext>
+            </a:extLst>
+          </p:cNvPr>
+          <p:cNvCxnSpPr>
+            <a:cxnSpLocks/>
+          </p:cNvCxnSpPr>
+          <p:nvPr/>
+        </p:nvCxnSpPr>
+        <p:spPr>
+          <a:xfrm>
+            <a:off x="1164915" y="3176467"/>
+            <a:ext cx="397475" cy="1030"/>
+          </a:xfrm>
+          <a:prstGeom prst="straightConnector1">
+            <a:avLst/>
+          </a:prstGeom>
+          <a:ln>
+            <a:solidFill>
+              <a:srgbClr val="002060"/>
+            </a:solidFill>
+            <a:prstDash val="lgDash"/>
+            <a:headEnd type="none"/>
+            <a:tailEnd type="triangle"/>
+          </a:ln>
+        </p:spPr>
+        <p:style>
+          <a:lnRef idx="1">
+            <a:schemeClr val="accent1"/>
+          </a:lnRef>
+          <a:fillRef idx="0">
+            <a:schemeClr val="accent1"/>
+          </a:fillRef>
+          <a:effectRef idx="0">
+            <a:schemeClr val="accent1"/>
+          </a:effectRef>
+          <a:fontRef idx="minor">
+            <a:schemeClr val="tx1"/>
+          </a:fontRef>
+        </p:style>
+      </p:cxnSp>
+      <p:cxnSp>
+        <p:nvCxnSpPr>
+          <p:cNvPr id="24" name="Connector: Elbow 23">
+            <a:extLst>
+              <a:ext uri="{FF2B5EF4-FFF2-40B4-BE49-F238E27FC236}">
+                <a16:creationId xmlns:a16="http://schemas.microsoft.com/office/drawing/2014/main" id="{0D31E233-450A-4411-A706-040A98EB4B42}"/>
+              </a:ext>
+            </a:extLst>
+          </p:cNvPr>
+          <p:cNvCxnSpPr>
+            <a:cxnSpLocks/>
+            <a:stCxn id="15" idx="3"/>
+            <a:endCxn id="277" idx="2"/>
+          </p:cNvCxnSpPr>
+          <p:nvPr/>
+        </p:nvCxnSpPr>
+        <p:spPr>
+          <a:xfrm flipV="1">
+            <a:off x="5243807" y="2343153"/>
+            <a:ext cx="280059" cy="839113"/>
+          </a:xfrm>
+          <a:prstGeom prst="bentConnector2">
+            <a:avLst/>
+          </a:prstGeom>
+          <a:ln>
+            <a:tailEnd type="triangle"/>
+          </a:ln>
+        </p:spPr>
+        <p:style>
+          <a:lnRef idx="1">
+            <a:schemeClr val="accent1"/>
+          </a:lnRef>
+          <a:fillRef idx="0">
+            <a:schemeClr val="accent1"/>
+          </a:fillRef>
+          <a:effectRef idx="0">
+            <a:schemeClr val="accent1"/>
+          </a:effectRef>
+          <a:fontRef idx="minor">
+            <a:schemeClr val="tx1"/>
+          </a:fontRef>
+        </p:style>
+      </p:cxnSp>
+      <p:cxnSp>
+        <p:nvCxnSpPr>
+          <p:cNvPr id="297" name="Straight Arrow Connector 296">
+            <a:extLst>
+              <a:ext uri="{FF2B5EF4-FFF2-40B4-BE49-F238E27FC236}">
+                <a16:creationId xmlns:a16="http://schemas.microsoft.com/office/drawing/2014/main" id="{53857752-0C3B-4B8E-BE6F-4817FC7AA1F5}"/>
+              </a:ext>
+            </a:extLst>
+          </p:cNvPr>
+          <p:cNvCxnSpPr>
+            <a:cxnSpLocks/>
+          </p:cNvCxnSpPr>
+          <p:nvPr/>
+        </p:nvCxnSpPr>
+        <p:spPr>
+          <a:xfrm>
+            <a:off x="6301360" y="1331088"/>
+            <a:ext cx="958852" cy="0"/>
+          </a:xfrm>
+          <a:prstGeom prst="straightConnector1">
+            <a:avLst/>
+          </a:prstGeom>
+          <a:ln>
+            <a:tailEnd type="triangle"/>
+          </a:ln>
+        </p:spPr>
+        <p:style>
+          <a:lnRef idx="1">
+            <a:schemeClr val="accent1"/>
+          </a:lnRef>
+          <a:fillRef idx="0">
+            <a:schemeClr val="accent1"/>
+          </a:fillRef>
+          <a:effectRef idx="0">
+            <a:schemeClr val="accent1"/>
+          </a:effectRef>
+          <a:fontRef idx="minor">
+            <a:schemeClr val="tx1"/>
+          </a:fontRef>
+        </p:style>
+      </p:cxnSp>
+      <p:cxnSp>
+        <p:nvCxnSpPr>
+          <p:cNvPr id="27" name="Connector: Elbow 26">
+            <a:extLst>
+              <a:ext uri="{FF2B5EF4-FFF2-40B4-BE49-F238E27FC236}">
+                <a16:creationId xmlns:a16="http://schemas.microsoft.com/office/drawing/2014/main" id="{8E37335D-3CF9-43DF-A8F0-A744F9377689}"/>
+              </a:ext>
+            </a:extLst>
+          </p:cNvPr>
+          <p:cNvCxnSpPr>
+            <a:cxnSpLocks/>
+            <a:stCxn id="374" idx="1"/>
+            <a:endCxn id="239" idx="3"/>
+          </p:cNvCxnSpPr>
+          <p:nvPr/>
+        </p:nvCxnSpPr>
+        <p:spPr>
+          <a:xfrm rot="10800000" flipV="1">
+            <a:off x="9066116" y="1340450"/>
+            <a:ext cx="1009610" cy="7289"/>
+          </a:xfrm>
+          <a:prstGeom prst="bentConnector3">
+            <a:avLst>
+              <a:gd name="adj1" fmla="val 50000"/>
+            </a:avLst>
+          </a:prstGeom>
+          <a:ln>
+            <a:tailEnd type="triangle"/>
+          </a:ln>
+        </p:spPr>
+        <p:style>
+          <a:lnRef idx="1">
+            <a:schemeClr val="accent1"/>
+          </a:lnRef>
+          <a:fillRef idx="0">
+            <a:schemeClr val="accent1"/>
+          </a:fillRef>
+          <a:effectRef idx="0">
+            <a:schemeClr val="accent1"/>
+          </a:effectRef>
+          <a:fontRef idx="minor">
+            <a:schemeClr val="tx1"/>
+          </a:fontRef>
+        </p:style>
+      </p:cxnSp>
+      <p:sp>
+        <p:nvSpPr>
+          <p:cNvPr id="304" name="TextBox 303">
+            <a:extLst>
+              <a:ext uri="{FF2B5EF4-FFF2-40B4-BE49-F238E27FC236}">
+                <a16:creationId xmlns:a16="http://schemas.microsoft.com/office/drawing/2014/main" id="{29EFAA03-EC33-4965-AB56-AF443B93BAAA}"/>
+              </a:ext>
+            </a:extLst>
+          </p:cNvPr>
+          <p:cNvSpPr txBox="1"/>
+          <p:nvPr/>
+        </p:nvSpPr>
+        <p:spPr>
+          <a:xfrm>
+            <a:off x="9344407" y="1254096"/>
+            <a:ext cx="841980" cy="912741"/>
+          </a:xfrm>
+          <a:prstGeom prst="rect">
+            <a:avLst/>
+          </a:prstGeom>
+          <a:noFill/>
+        </p:spPr>
+        <p:txBody>
+          <a:bodyPr wrap="square" lIns="91440" tIns="143347" rIns="91440" bIns="143347" rtlCol="0">
+            <a:spAutoFit/>
+          </a:bodyPr>
+          <a:lstStyle>
+            <a:defPPr>
+              <a:defRPr lang="en-US"/>
+            </a:defPPr>
+            <a:lvl1pPr defTabSz="913781">
+              <a:lnSpc>
+                <a:spcPct val="90000"/>
+              </a:lnSpc>
+              <a:spcBef>
+                <a:spcPct val="0"/>
+              </a:spcBef>
+              <a:spcAft>
+                <a:spcPts val="588"/>
+              </a:spcAft>
+              <a:defRPr sz="1125" kern="0" spc="-29">
+                <a:gradFill>
+                  <a:gsLst>
+                    <a:gs pos="1250">
+                      <a:schemeClr val="tx1"/>
+                    </a:gs>
+                    <a:gs pos="100000">
+                      <a:schemeClr val="tx1"/>
+                    </a:gs>
+                  </a:gsLst>
+                  <a:lin ang="5400000" scaled="0"/>
+                </a:gradFill>
+                <a:latin typeface="Segoe UI Semilight" panose="020B0402040204020203" pitchFamily="34" charset="0"/>
+                <a:ea typeface="MS PGothic" panose="020B0600070205080204" pitchFamily="34" charset="-128"/>
+                <a:cs typeface="Segoe UI Semilight" panose="020B0402040204020203" pitchFamily="34" charset="0"/>
+              </a:defRPr>
+            </a:lvl1pPr>
+            <a:lvl2pPr>
+              <a:defRPr>
+                <a:solidFill>
+                  <a:schemeClr val="tx1"/>
+                </a:solidFill>
+              </a:defRPr>
+            </a:lvl2pPr>
+            <a:lvl3pPr>
+              <a:defRPr>
+                <a:solidFill>
+                  <a:schemeClr val="tx1"/>
+                </a:solidFill>
+              </a:defRPr>
+            </a:lvl3pPr>
+            <a:lvl4pPr>
+              <a:defRPr>
+                <a:solidFill>
+                  <a:schemeClr val="tx1"/>
+                </a:solidFill>
+              </a:defRPr>
+            </a:lvl4pPr>
+            <a:lvl5pPr>
+              <a:defRPr>
+                <a:solidFill>
+                  <a:schemeClr val="tx1"/>
+                </a:solidFill>
+              </a:defRPr>
+            </a:lvl5pPr>
+            <a:lvl6pPr>
+              <a:defRPr>
+                <a:solidFill>
+                  <a:schemeClr val="tx1"/>
+                </a:solidFill>
+              </a:defRPr>
+            </a:lvl6pPr>
+            <a:lvl7pPr>
+              <a:defRPr>
+                <a:solidFill>
+                  <a:schemeClr val="tx1"/>
+                </a:solidFill>
+              </a:defRPr>
+            </a:lvl7pPr>
+            <a:lvl8pPr>
+              <a:defRPr>
+                <a:solidFill>
+                  <a:schemeClr val="tx1"/>
+                </a:solidFill>
+              </a:defRPr>
+            </a:lvl8pPr>
+            <a:lvl9pPr>
+              <a:defRPr>
+                <a:solidFill>
+                  <a:schemeClr val="tx1"/>
+                </a:solidFill>
+              </a:defRPr>
+            </a:lvl9pPr>
+          </a:lstStyle>
+          <a:p>
+            <a:r>
+              <a:rPr lang="en-US" sz="900" dirty="0">
+                <a:solidFill>
+                  <a:schemeClr val="tx1"/>
+                </a:solidFill>
+                <a:latin typeface="Segoe UI Semibold" panose="020B0702040204020203" pitchFamily="34" charset="0"/>
+                <a:cs typeface="Segoe UI Semibold" panose="020B0702040204020203" pitchFamily="34" charset="0"/>
+              </a:rPr>
+              <a:t>Register Automated</a:t>
+            </a:r>
+            <a:br>
+              <a:rPr lang="en-US" sz="900" dirty="0">
+                <a:solidFill>
+                  <a:schemeClr val="tx1"/>
+                </a:solidFill>
+                <a:latin typeface="Segoe UI Semibold" panose="020B0702040204020203" pitchFamily="34" charset="0"/>
+                <a:cs typeface="Segoe UI Semibold" panose="020B0702040204020203" pitchFamily="34" charset="0"/>
+              </a:rPr>
+            </a:br>
+            <a:r>
+              <a:rPr lang="en-US" sz="900" dirty="0">
+                <a:solidFill>
+                  <a:schemeClr val="tx1"/>
+                </a:solidFill>
+                <a:latin typeface="Segoe UI Semibold" panose="020B0702040204020203" pitchFamily="34" charset="0"/>
+                <a:cs typeface="Segoe UI Semibold" panose="020B0702040204020203" pitchFamily="34" charset="0"/>
+              </a:rPr>
+              <a:t>Machine</a:t>
+            </a:r>
+            <a:br>
+              <a:rPr lang="en-US" sz="900" dirty="0">
+                <a:solidFill>
+                  <a:schemeClr val="tx1"/>
+                </a:solidFill>
+                <a:latin typeface="Segoe UI Semibold" panose="020B0702040204020203" pitchFamily="34" charset="0"/>
+                <a:cs typeface="Segoe UI Semibold" panose="020B0702040204020203" pitchFamily="34" charset="0"/>
+              </a:rPr>
+            </a:br>
+            <a:r>
+              <a:rPr lang="en-US" sz="900" dirty="0">
+                <a:solidFill>
+                  <a:schemeClr val="tx1"/>
+                </a:solidFill>
+                <a:latin typeface="Segoe UI Semibold" panose="020B0702040204020203" pitchFamily="34" charset="0"/>
+                <a:cs typeface="Segoe UI Semibold" panose="020B0702040204020203" pitchFamily="34" charset="0"/>
+              </a:rPr>
+              <a:t>Learning</a:t>
+            </a:r>
+            <a:br>
+              <a:rPr lang="en-US" sz="900" dirty="0">
+                <a:solidFill>
+                  <a:schemeClr val="tx1"/>
+                </a:solidFill>
+                <a:latin typeface="Segoe UI Semibold" panose="020B0702040204020203" pitchFamily="34" charset="0"/>
+                <a:cs typeface="Segoe UI Semibold" panose="020B0702040204020203" pitchFamily="34" charset="0"/>
+              </a:rPr>
+            </a:br>
+            <a:r>
+              <a:rPr lang="en-US" sz="900" dirty="0">
+                <a:solidFill>
+                  <a:schemeClr val="tx1"/>
+                </a:solidFill>
+                <a:latin typeface="Segoe UI Semibold" panose="020B0702040204020203" pitchFamily="34" charset="0"/>
+                <a:cs typeface="Segoe UI Semibold" panose="020B0702040204020203" pitchFamily="34" charset="0"/>
+              </a:rPr>
+              <a:t>Model</a:t>
+            </a:r>
+          </a:p>
+        </p:txBody>
+      </p:sp>
+      <p:sp>
+        <p:nvSpPr>
+          <p:cNvPr id="311" name="TextBox 310">
+            <a:extLst>
+              <a:ext uri="{FF2B5EF4-FFF2-40B4-BE49-F238E27FC236}">
+                <a16:creationId xmlns:a16="http://schemas.microsoft.com/office/drawing/2014/main" id="{19A8D135-E2DE-4084-A5B9-735A3E660983}"/>
+              </a:ext>
+            </a:extLst>
+          </p:cNvPr>
+          <p:cNvSpPr txBox="1"/>
+          <p:nvPr/>
+        </p:nvSpPr>
+        <p:spPr>
+          <a:xfrm>
+            <a:off x="6350992" y="1227118"/>
+            <a:ext cx="841980" cy="663442"/>
+          </a:xfrm>
+          <a:prstGeom prst="rect">
+            <a:avLst/>
+          </a:prstGeom>
+          <a:noFill/>
+        </p:spPr>
+        <p:txBody>
+          <a:bodyPr wrap="square" lIns="91440" tIns="143347" rIns="91440" bIns="143347" rtlCol="0">
+            <a:spAutoFit/>
+          </a:bodyPr>
+          <a:lstStyle>
+            <a:defPPr>
+              <a:defRPr lang="en-US"/>
+            </a:defPPr>
+            <a:lvl1pPr defTabSz="913781">
+              <a:lnSpc>
+                <a:spcPct val="90000"/>
+              </a:lnSpc>
+              <a:spcBef>
+                <a:spcPct val="0"/>
+              </a:spcBef>
+              <a:spcAft>
+                <a:spcPts val="588"/>
+              </a:spcAft>
+              <a:defRPr sz="1125" kern="0" spc="-29">
+                <a:gradFill>
+                  <a:gsLst>
+                    <a:gs pos="1250">
+                      <a:schemeClr val="tx1"/>
+                    </a:gs>
+                    <a:gs pos="100000">
+                      <a:schemeClr val="tx1"/>
+                    </a:gs>
+                  </a:gsLst>
+                  <a:lin ang="5400000" scaled="0"/>
+                </a:gradFill>
+                <a:latin typeface="Segoe UI Semilight" panose="020B0402040204020203" pitchFamily="34" charset="0"/>
+                <a:ea typeface="MS PGothic" panose="020B0600070205080204" pitchFamily="34" charset="-128"/>
+                <a:cs typeface="Segoe UI Semilight" panose="020B0402040204020203" pitchFamily="34" charset="0"/>
+              </a:defRPr>
+            </a:lvl1pPr>
+            <a:lvl2pPr>
+              <a:defRPr>
+                <a:solidFill>
+                  <a:schemeClr val="tx1"/>
+                </a:solidFill>
+              </a:defRPr>
+            </a:lvl2pPr>
+            <a:lvl3pPr>
+              <a:defRPr>
+                <a:solidFill>
+                  <a:schemeClr val="tx1"/>
+                </a:solidFill>
+              </a:defRPr>
+            </a:lvl3pPr>
+            <a:lvl4pPr>
+              <a:defRPr>
+                <a:solidFill>
+                  <a:schemeClr val="tx1"/>
+                </a:solidFill>
+              </a:defRPr>
+            </a:lvl4pPr>
+            <a:lvl5pPr>
+              <a:defRPr>
+                <a:solidFill>
+                  <a:schemeClr val="tx1"/>
+                </a:solidFill>
+              </a:defRPr>
+            </a:lvl5pPr>
+            <a:lvl6pPr>
+              <a:defRPr>
+                <a:solidFill>
+                  <a:schemeClr val="tx1"/>
+                </a:solidFill>
+              </a:defRPr>
+            </a:lvl6pPr>
+            <a:lvl7pPr>
+              <a:defRPr>
+                <a:solidFill>
+                  <a:schemeClr val="tx1"/>
+                </a:solidFill>
+              </a:defRPr>
+            </a:lvl7pPr>
+            <a:lvl8pPr>
+              <a:defRPr>
+                <a:solidFill>
+                  <a:schemeClr val="tx1"/>
+                </a:solidFill>
+              </a:defRPr>
+            </a:lvl8pPr>
+            <a:lvl9pPr>
+              <a:defRPr>
+                <a:solidFill>
+                  <a:schemeClr val="tx1"/>
+                </a:solidFill>
+              </a:defRPr>
+            </a:lvl9pPr>
+          </a:lstStyle>
+          <a:p>
+            <a:pPr algn="r"/>
+            <a:r>
+              <a:rPr lang="en-US" sz="900" dirty="0">
+                <a:solidFill>
+                  <a:schemeClr val="tx1"/>
+                </a:solidFill>
+                <a:latin typeface="Segoe UI Semibold" panose="020B0702040204020203" pitchFamily="34" charset="0"/>
+                <a:cs typeface="Segoe UI Semibold" panose="020B0702040204020203" pitchFamily="34" charset="0"/>
+              </a:rPr>
+              <a:t>Track Runs &amp; </a:t>
+            </a:r>
+            <a:br>
+              <a:rPr lang="en-US" sz="900" dirty="0">
+                <a:solidFill>
+                  <a:schemeClr val="tx1"/>
+                </a:solidFill>
+                <a:latin typeface="Segoe UI Semibold" panose="020B0702040204020203" pitchFamily="34" charset="0"/>
+                <a:cs typeface="Segoe UI Semibold" panose="020B0702040204020203" pitchFamily="34" charset="0"/>
+              </a:rPr>
+            </a:br>
+            <a:r>
+              <a:rPr lang="en-US" sz="900" dirty="0">
+                <a:solidFill>
+                  <a:schemeClr val="tx1"/>
+                </a:solidFill>
+                <a:latin typeface="Segoe UI Semibold" panose="020B0702040204020203" pitchFamily="34" charset="0"/>
+                <a:cs typeface="Segoe UI Semibold" panose="020B0702040204020203" pitchFamily="34" charset="0"/>
+              </a:rPr>
+              <a:t>Register Models</a:t>
+            </a:r>
+          </a:p>
+        </p:txBody>
+      </p:sp>
+      <p:sp>
+        <p:nvSpPr>
+          <p:cNvPr id="324" name="TextBox 323">
+            <a:extLst>
+              <a:ext uri="{FF2B5EF4-FFF2-40B4-BE49-F238E27FC236}">
+                <a16:creationId xmlns:a16="http://schemas.microsoft.com/office/drawing/2014/main" id="{BE812001-BF12-4014-AB1B-6ECACAF0D775}"/>
+              </a:ext>
+            </a:extLst>
+          </p:cNvPr>
+          <p:cNvSpPr txBox="1"/>
+          <p:nvPr/>
+        </p:nvSpPr>
+        <p:spPr>
+          <a:xfrm>
+            <a:off x="6599915" y="2709731"/>
+            <a:ext cx="841980" cy="538793"/>
+          </a:xfrm>
+          <a:prstGeom prst="rect">
+            <a:avLst/>
+          </a:prstGeom>
+          <a:noFill/>
+        </p:spPr>
+        <p:txBody>
+          <a:bodyPr wrap="square" lIns="91440" tIns="143347" rIns="91440" bIns="143347" rtlCol="0">
+            <a:spAutoFit/>
+          </a:bodyPr>
+          <a:lstStyle>
+            <a:defPPr>
+              <a:defRPr lang="en-US"/>
+            </a:defPPr>
+            <a:lvl1pPr defTabSz="913781">
+              <a:lnSpc>
+                <a:spcPct val="90000"/>
+              </a:lnSpc>
+              <a:spcBef>
+                <a:spcPct val="0"/>
+              </a:spcBef>
+              <a:spcAft>
+                <a:spcPts val="588"/>
+              </a:spcAft>
+              <a:defRPr sz="1125" kern="0" spc="-29">
+                <a:gradFill>
+                  <a:gsLst>
+                    <a:gs pos="1250">
+                      <a:schemeClr val="tx1"/>
+                    </a:gs>
+                    <a:gs pos="100000">
+                      <a:schemeClr val="tx1"/>
+                    </a:gs>
+                  </a:gsLst>
+                  <a:lin ang="5400000" scaled="0"/>
+                </a:gradFill>
+                <a:latin typeface="Segoe UI Semilight" panose="020B0402040204020203" pitchFamily="34" charset="0"/>
+                <a:ea typeface="MS PGothic" panose="020B0600070205080204" pitchFamily="34" charset="-128"/>
+                <a:cs typeface="Segoe UI Semilight" panose="020B0402040204020203" pitchFamily="34" charset="0"/>
+              </a:defRPr>
+            </a:lvl1pPr>
+            <a:lvl2pPr>
+              <a:defRPr>
+                <a:solidFill>
+                  <a:schemeClr val="tx1"/>
+                </a:solidFill>
+              </a:defRPr>
+            </a:lvl2pPr>
+            <a:lvl3pPr>
+              <a:defRPr>
+                <a:solidFill>
+                  <a:schemeClr val="tx1"/>
+                </a:solidFill>
+              </a:defRPr>
+            </a:lvl3pPr>
+            <a:lvl4pPr>
+              <a:defRPr>
+                <a:solidFill>
+                  <a:schemeClr val="tx1"/>
+                </a:solidFill>
+              </a:defRPr>
+            </a:lvl4pPr>
+            <a:lvl5pPr>
+              <a:defRPr>
+                <a:solidFill>
+                  <a:schemeClr val="tx1"/>
+                </a:solidFill>
+              </a:defRPr>
+            </a:lvl5pPr>
+            <a:lvl6pPr>
+              <a:defRPr>
+                <a:solidFill>
+                  <a:schemeClr val="tx1"/>
+                </a:solidFill>
+              </a:defRPr>
+            </a:lvl6pPr>
+            <a:lvl7pPr>
+              <a:defRPr>
+                <a:solidFill>
+                  <a:schemeClr val="tx1"/>
+                </a:solidFill>
+              </a:defRPr>
+            </a:lvl7pPr>
+            <a:lvl8pPr>
+              <a:defRPr>
+                <a:solidFill>
+                  <a:schemeClr val="tx1"/>
+                </a:solidFill>
+              </a:defRPr>
+            </a:lvl8pPr>
+            <a:lvl9pPr>
+              <a:defRPr>
+                <a:solidFill>
+                  <a:schemeClr val="tx1"/>
+                </a:solidFill>
+              </a:defRPr>
+            </a:lvl9pPr>
+          </a:lstStyle>
+          <a:p>
+            <a:pPr algn="r"/>
+            <a:r>
+              <a:rPr lang="en-US" sz="900" dirty="0">
+                <a:solidFill>
+                  <a:schemeClr val="tx1"/>
+                </a:solidFill>
+                <a:latin typeface="Segoe UI Semibold" panose="020B0702040204020203" pitchFamily="34" charset="0"/>
+                <a:cs typeface="Segoe UI Semibold" panose="020B0702040204020203" pitchFamily="34" charset="0"/>
+              </a:rPr>
+              <a:t>Retrieve</a:t>
+            </a:r>
+            <a:br>
+              <a:rPr lang="en-US" sz="900" dirty="0">
+                <a:solidFill>
+                  <a:schemeClr val="tx1"/>
+                </a:solidFill>
+                <a:latin typeface="Segoe UI Semibold" panose="020B0702040204020203" pitchFamily="34" charset="0"/>
+                <a:cs typeface="Segoe UI Semibold" panose="020B0702040204020203" pitchFamily="34" charset="0"/>
+              </a:rPr>
+            </a:br>
+            <a:r>
+              <a:rPr lang="en-US" sz="900" dirty="0">
+                <a:solidFill>
+                  <a:schemeClr val="tx1"/>
+                </a:solidFill>
+                <a:latin typeface="Segoe UI Semibold" panose="020B0702040204020203" pitchFamily="34" charset="0"/>
+                <a:cs typeface="Segoe UI Semibold" panose="020B0702040204020203" pitchFamily="34" charset="0"/>
+              </a:rPr>
+              <a:t>Model</a:t>
+            </a:r>
+          </a:p>
+        </p:txBody>
+      </p:sp>
+      <p:sp>
+        <p:nvSpPr>
+          <p:cNvPr id="344" name="TextBox 343">
+            <a:extLst>
+              <a:ext uri="{FF2B5EF4-FFF2-40B4-BE49-F238E27FC236}">
+                <a16:creationId xmlns:a16="http://schemas.microsoft.com/office/drawing/2014/main" id="{2627AA02-E1AC-411E-9BA2-4A8EE92CC880}"/>
+              </a:ext>
+            </a:extLst>
+          </p:cNvPr>
+          <p:cNvSpPr txBox="1"/>
+          <p:nvPr/>
+        </p:nvSpPr>
+        <p:spPr>
+          <a:xfrm>
+            <a:off x="7512010" y="3636682"/>
+            <a:ext cx="841980" cy="538793"/>
+          </a:xfrm>
+          <a:prstGeom prst="rect">
+            <a:avLst/>
+          </a:prstGeom>
+          <a:noFill/>
+        </p:spPr>
+        <p:txBody>
+          <a:bodyPr wrap="square" lIns="91440" tIns="143347" rIns="91440" bIns="143347" rtlCol="0">
+            <a:spAutoFit/>
+          </a:bodyPr>
+          <a:lstStyle>
+            <a:defPPr>
+              <a:defRPr lang="en-US"/>
+            </a:defPPr>
+            <a:lvl1pPr defTabSz="913781">
+              <a:lnSpc>
+                <a:spcPct val="90000"/>
+              </a:lnSpc>
+              <a:spcBef>
+                <a:spcPct val="0"/>
+              </a:spcBef>
+              <a:spcAft>
+                <a:spcPts val="588"/>
+              </a:spcAft>
+              <a:defRPr sz="1125" kern="0" spc="-29">
+                <a:gradFill>
+                  <a:gsLst>
+                    <a:gs pos="1250">
+                      <a:schemeClr val="tx1"/>
+                    </a:gs>
+                    <a:gs pos="100000">
+                      <a:schemeClr val="tx1"/>
+                    </a:gs>
+                  </a:gsLst>
+                  <a:lin ang="5400000" scaled="0"/>
+                </a:gradFill>
+                <a:latin typeface="Segoe UI Semilight" panose="020B0402040204020203" pitchFamily="34" charset="0"/>
+                <a:ea typeface="MS PGothic" panose="020B0600070205080204" pitchFamily="34" charset="-128"/>
+                <a:cs typeface="Segoe UI Semilight" panose="020B0402040204020203" pitchFamily="34" charset="0"/>
+              </a:defRPr>
+            </a:lvl1pPr>
+            <a:lvl2pPr>
+              <a:defRPr>
+                <a:solidFill>
+                  <a:schemeClr val="tx1"/>
+                </a:solidFill>
+              </a:defRPr>
+            </a:lvl2pPr>
+            <a:lvl3pPr>
+              <a:defRPr>
+                <a:solidFill>
+                  <a:schemeClr val="tx1"/>
+                </a:solidFill>
+              </a:defRPr>
+            </a:lvl3pPr>
+            <a:lvl4pPr>
+              <a:defRPr>
+                <a:solidFill>
+                  <a:schemeClr val="tx1"/>
+                </a:solidFill>
+              </a:defRPr>
+            </a:lvl4pPr>
+            <a:lvl5pPr>
+              <a:defRPr>
+                <a:solidFill>
+                  <a:schemeClr val="tx1"/>
+                </a:solidFill>
+              </a:defRPr>
+            </a:lvl5pPr>
+            <a:lvl6pPr>
+              <a:defRPr>
+                <a:solidFill>
+                  <a:schemeClr val="tx1"/>
+                </a:solidFill>
+              </a:defRPr>
+            </a:lvl6pPr>
+            <a:lvl7pPr>
+              <a:defRPr>
+                <a:solidFill>
+                  <a:schemeClr val="tx1"/>
+                </a:solidFill>
+              </a:defRPr>
+            </a:lvl7pPr>
+            <a:lvl8pPr>
+              <a:defRPr>
+                <a:solidFill>
+                  <a:schemeClr val="tx1"/>
+                </a:solidFill>
+              </a:defRPr>
+            </a:lvl8pPr>
+            <a:lvl9pPr>
+              <a:defRPr>
+                <a:solidFill>
+                  <a:schemeClr val="tx1"/>
+                </a:solidFill>
+              </a:defRPr>
+            </a:lvl9pPr>
+          </a:lstStyle>
+          <a:p>
+            <a:r>
+              <a:rPr lang="en-US" sz="900" dirty="0">
+                <a:solidFill>
+                  <a:schemeClr val="tx1"/>
+                </a:solidFill>
+                <a:latin typeface="Segoe UI Semibold" panose="020B0702040204020203" pitchFamily="34" charset="0"/>
+                <a:cs typeface="Segoe UI Semibold" panose="020B0702040204020203" pitchFamily="34" charset="0"/>
+              </a:rPr>
+              <a:t>Simulated</a:t>
+            </a:r>
+            <a:br>
+              <a:rPr lang="en-US" sz="900" dirty="0">
+                <a:solidFill>
+                  <a:schemeClr val="tx1"/>
+                </a:solidFill>
+                <a:latin typeface="Segoe UI Semibold" panose="020B0702040204020203" pitchFamily="34" charset="0"/>
+                <a:cs typeface="Segoe UI Semibold" panose="020B0702040204020203" pitchFamily="34" charset="0"/>
+              </a:rPr>
+            </a:br>
+            <a:r>
+              <a:rPr lang="en-US" sz="900" dirty="0">
+                <a:solidFill>
+                  <a:schemeClr val="tx1"/>
+                </a:solidFill>
+                <a:latin typeface="Segoe UI Semibold" panose="020B0702040204020203" pitchFamily="34" charset="0"/>
+                <a:cs typeface="Segoe UI Semibold" panose="020B0702040204020203" pitchFamily="34" charset="0"/>
+              </a:rPr>
+              <a:t>Data Stream</a:t>
+            </a:r>
+          </a:p>
+        </p:txBody>
+      </p:sp>
+      <p:sp>
+        <p:nvSpPr>
+          <p:cNvPr id="345" name="Rectangle 344">
+            <a:extLst>
+              <a:ext uri="{FF2B5EF4-FFF2-40B4-BE49-F238E27FC236}">
+                <a16:creationId xmlns:a16="http://schemas.microsoft.com/office/drawing/2014/main" id="{E16DE04F-22FD-4DA0-9043-67C56F6364B6}"/>
+              </a:ext>
+            </a:extLst>
+          </p:cNvPr>
+          <p:cNvSpPr/>
+          <p:nvPr/>
+        </p:nvSpPr>
+        <p:spPr>
+          <a:xfrm>
+            <a:off x="8613332" y="5583489"/>
+            <a:ext cx="1212191" cy="369332"/>
+          </a:xfrm>
+          <a:prstGeom prst="rect">
+            <a:avLst/>
+          </a:prstGeom>
+        </p:spPr>
+        <p:txBody>
+          <a:bodyPr wrap="none">
+            <a:spAutoFit/>
+          </a:bodyPr>
+          <a:lstStyle/>
+          <a:p>
+            <a:pPr algn="ctr" defTabSz="950973"/>
+            <a:r>
+              <a:rPr lang="en-US" sz="900" kern="0" dirty="0">
+                <a:latin typeface="Segoe UI Semibold" panose="020B0702040204020203" pitchFamily="34" charset="0"/>
+                <a:ea typeface="MS PGothic" panose="020B0600070205080204" pitchFamily="34" charset="-128"/>
+                <a:cs typeface="Segoe UI Semibold" panose="020B0702040204020203" pitchFamily="34" charset="0"/>
+              </a:rPr>
+              <a:t>Azure Databricks</a:t>
+            </a:r>
+            <a:br>
+              <a:rPr lang="en-US" sz="900" kern="0" dirty="0">
+                <a:latin typeface="Segoe UI Semibold" panose="020B0702040204020203" pitchFamily="34" charset="0"/>
+                <a:ea typeface="MS PGothic" panose="020B0600070205080204" pitchFamily="34" charset="-128"/>
+                <a:cs typeface="Segoe UI Semibold" panose="020B0702040204020203" pitchFamily="34" charset="0"/>
+              </a:rPr>
+            </a:br>
+            <a:r>
+              <a:rPr lang="en-US" sz="900" kern="0" dirty="0">
+                <a:latin typeface="Segoe UI Semibold" panose="020B0702040204020203" pitchFamily="34" charset="0"/>
+                <a:ea typeface="MS PGothic" panose="020B0600070205080204" pitchFamily="34" charset="-128"/>
+                <a:cs typeface="Segoe UI Semibold" panose="020B0702040204020203" pitchFamily="34" charset="0"/>
+              </a:rPr>
+              <a:t>(Spark DataFrames)</a:t>
+            </a:r>
+          </a:p>
+        </p:txBody>
+      </p:sp>
+      <p:pic>
+        <p:nvPicPr>
+          <p:cNvPr id="347" name="Picture 271">
+            <a:extLst>
+              <a:ext uri="{FF2B5EF4-FFF2-40B4-BE49-F238E27FC236}">
+                <a16:creationId xmlns:a16="http://schemas.microsoft.com/office/drawing/2014/main" id="{FF1565B9-C3A8-4B4C-890E-590D7F1F989A}"/>
+              </a:ext>
+            </a:extLst>
+          </p:cNvPr>
+          <p:cNvPicPr>
+            <a:picLocks noChangeAspect="1"/>
+          </p:cNvPicPr>
+          <p:nvPr/>
+        </p:nvPicPr>
+        <p:blipFill>
+          <a:blip r:embed="rId3">
+            <a:extLst>
+              <a:ext uri="{96DAC541-7B7A-43D3-8B79-37D633B846F1}">
+                <asvg:svgBlip xmlns:asvg="http://schemas.microsoft.com/office/drawing/2016/SVG/main" r:embed="rId4"/>
+              </a:ext>
+            </a:extLst>
+          </a:blip>
+          <a:stretch>
+            <a:fillRect/>
+          </a:stretch>
+        </p:blipFill>
+        <p:spPr>
+          <a:xfrm>
+            <a:off x="8890351" y="4933070"/>
+            <a:ext cx="670390" cy="670390"/>
+          </a:xfrm>
+          <a:prstGeom prst="rect">
+            <a:avLst/>
+          </a:prstGeom>
+        </p:spPr>
+      </p:pic>
+      <p:sp>
+        <p:nvSpPr>
+          <p:cNvPr id="353" name="Rectangle: Rounded Corners 352">
+            <a:extLst>
+              <a:ext uri="{FF2B5EF4-FFF2-40B4-BE49-F238E27FC236}">
+                <a16:creationId xmlns:a16="http://schemas.microsoft.com/office/drawing/2014/main" id="{21382847-8D03-4638-84C9-D3B5FA082E27}"/>
+              </a:ext>
+            </a:extLst>
+          </p:cNvPr>
+          <p:cNvSpPr/>
+          <p:nvPr/>
+        </p:nvSpPr>
+        <p:spPr bwMode="auto">
+          <a:xfrm>
+            <a:off x="8312546" y="4821343"/>
+            <a:ext cx="1760026" cy="1147743"/>
+          </a:xfrm>
+          <a:prstGeom prst="roundRect">
+            <a:avLst/>
+          </a:prstGeom>
+          <a:noFill/>
+          <a:ln>
+            <a:solidFill>
+              <a:srgbClr val="002060"/>
+            </a:solidFill>
+            <a:prstDash val="sysDash"/>
+            <a:headEnd type="none" w="med" len="med"/>
+            <a:tailEnd type="none" w="med" len="med"/>
+          </a:ln>
+          <a:effectLst/>
+        </p:spPr>
+        <p:style>
+          <a:lnRef idx="1">
+            <a:schemeClr val="accent2"/>
+          </a:lnRef>
+          <a:fillRef idx="3">
+            <a:schemeClr val="accent2"/>
+          </a:fillRef>
+          <a:effectRef idx="2">
+            <a:schemeClr val="accent2"/>
+          </a:effectRef>
+          <a:fontRef idx="minor">
+            <a:schemeClr val="lt1"/>
+          </a:fontRef>
+        </p:style>
+        <p:txBody>
+          <a:bodyPr rot="0" spcFirstLastPara="0" vertOverflow="overflow" horzOverflow="overflow" vert="horz" wrap="square" lIns="182880" tIns="146304" rIns="182880" bIns="146304" numCol="1" spcCol="0" rtlCol="0" fromWordArt="0" anchor="t" anchorCtr="0" forceAA="0" compatLnSpc="1">
+            <a:prstTxWarp prst="textNoShape">
+              <a:avLst/>
+            </a:prstTxWarp>
+            <a:noAutofit/>
+          </a:bodyPr>
+          <a:lstStyle/>
+          <a:p>
+            <a:pPr algn="ctr" defTabSz="932472" fontAlgn="base">
+              <a:lnSpc>
+                <a:spcPct val="90000"/>
+              </a:lnSpc>
+              <a:spcBef>
+                <a:spcPct val="0"/>
+              </a:spcBef>
+              <a:spcAft>
+                <a:spcPct val="0"/>
+              </a:spcAft>
+            </a:pPr>
+            <a:endParaRPr lang="en-US" sz="2400" dirty="0" err="1">
+              <a:gradFill>
+                <a:gsLst>
+                  <a:gs pos="0">
+                    <a:srgbClr val="FFFFFF"/>
+                  </a:gs>
+                  <a:gs pos="100000">
+                    <a:srgbClr val="FFFFFF"/>
+                  </a:gs>
+                </a:gsLst>
+                <a:lin ang="5400000" scaled="0"/>
+              </a:gradFill>
+              <a:ea typeface="Segoe UI" pitchFamily="34" charset="0"/>
+              <a:cs typeface="Segoe UI" pitchFamily="34" charset="0"/>
+            </a:endParaRPr>
+          </a:p>
+        </p:txBody>
+      </p:sp>
+      <p:sp>
+        <p:nvSpPr>
+          <p:cNvPr id="367" name="TextBox 366">
+            <a:extLst>
+              <a:ext uri="{FF2B5EF4-FFF2-40B4-BE49-F238E27FC236}">
+                <a16:creationId xmlns:a16="http://schemas.microsoft.com/office/drawing/2014/main" id="{B20FD031-E373-40B1-B5B1-C0C3DE3EC414}"/>
+              </a:ext>
+            </a:extLst>
+          </p:cNvPr>
+          <p:cNvSpPr txBox="1"/>
+          <p:nvPr/>
+        </p:nvSpPr>
+        <p:spPr>
+          <a:xfrm>
+            <a:off x="8110959" y="4427542"/>
+            <a:ext cx="2232920" cy="489365"/>
+          </a:xfrm>
+          <a:prstGeom prst="rect">
+            <a:avLst/>
+          </a:prstGeom>
+          <a:noFill/>
+        </p:spPr>
+        <p:txBody>
+          <a:bodyPr wrap="none" lIns="182880" tIns="146304" rIns="182880" bIns="146304" rtlCol="0">
+            <a:spAutoFit/>
+          </a:bodyPr>
+          <a:lstStyle/>
+          <a:p>
+            <a:pPr algn="r">
+              <a:lnSpc>
+                <a:spcPct val="90000"/>
+              </a:lnSpc>
+              <a:spcAft>
+                <a:spcPts val="600"/>
+              </a:spcAft>
+            </a:pPr>
+            <a:r>
+              <a:rPr lang="en-US" sz="1400" dirty="0">
+                <a:gradFill>
+                  <a:gsLst>
+                    <a:gs pos="2917">
+                      <a:schemeClr val="tx1"/>
+                    </a:gs>
+                    <a:gs pos="30000">
+                      <a:schemeClr val="tx1"/>
+                    </a:gs>
+                  </a:gsLst>
+                  <a:lin ang="5400000" scaled="0"/>
+                </a:gradFill>
+              </a:rPr>
+              <a:t>BATCH DATA PROCESSING</a:t>
+            </a:r>
+          </a:p>
+        </p:txBody>
+      </p:sp>
+      <p:sp>
+        <p:nvSpPr>
+          <p:cNvPr id="369" name="TextBox 368">
+            <a:extLst>
+              <a:ext uri="{FF2B5EF4-FFF2-40B4-BE49-F238E27FC236}">
+                <a16:creationId xmlns:a16="http://schemas.microsoft.com/office/drawing/2014/main" id="{9EEC6BD6-2760-4754-BC6B-EFDA9E60B50F}"/>
+              </a:ext>
+            </a:extLst>
+          </p:cNvPr>
+          <p:cNvSpPr txBox="1"/>
+          <p:nvPr/>
+        </p:nvSpPr>
+        <p:spPr>
+          <a:xfrm>
+            <a:off x="5933803" y="5169346"/>
+            <a:ext cx="1087102" cy="414143"/>
+          </a:xfrm>
+          <a:prstGeom prst="rect">
+            <a:avLst/>
+          </a:prstGeom>
+          <a:noFill/>
+        </p:spPr>
+        <p:txBody>
+          <a:bodyPr wrap="square" lIns="91440" tIns="143347" rIns="91440" bIns="143347" rtlCol="0">
+            <a:spAutoFit/>
+          </a:bodyPr>
+          <a:lstStyle>
+            <a:defPPr>
+              <a:defRPr lang="en-US"/>
+            </a:defPPr>
+            <a:lvl1pPr defTabSz="913781">
+              <a:lnSpc>
+                <a:spcPct val="90000"/>
+              </a:lnSpc>
+              <a:spcBef>
+                <a:spcPct val="0"/>
+              </a:spcBef>
+              <a:spcAft>
+                <a:spcPts val="588"/>
+              </a:spcAft>
+              <a:defRPr sz="1125" kern="0" spc="-29">
+                <a:gradFill>
+                  <a:gsLst>
+                    <a:gs pos="1250">
+                      <a:schemeClr val="tx1"/>
+                    </a:gs>
+                    <a:gs pos="100000">
+                      <a:schemeClr val="tx1"/>
+                    </a:gs>
+                  </a:gsLst>
+                  <a:lin ang="5400000" scaled="0"/>
+                </a:gradFill>
+                <a:latin typeface="Segoe UI Semilight" panose="020B0402040204020203" pitchFamily="34" charset="0"/>
+                <a:ea typeface="MS PGothic" panose="020B0600070205080204" pitchFamily="34" charset="-128"/>
+                <a:cs typeface="Segoe UI Semilight" panose="020B0402040204020203" pitchFamily="34" charset="0"/>
+              </a:defRPr>
+            </a:lvl1pPr>
+            <a:lvl2pPr>
+              <a:defRPr>
+                <a:solidFill>
+                  <a:schemeClr val="tx1"/>
+                </a:solidFill>
+              </a:defRPr>
+            </a:lvl2pPr>
+            <a:lvl3pPr>
+              <a:defRPr>
+                <a:solidFill>
+                  <a:schemeClr val="tx1"/>
+                </a:solidFill>
+              </a:defRPr>
+            </a:lvl3pPr>
+            <a:lvl4pPr>
+              <a:defRPr>
+                <a:solidFill>
+                  <a:schemeClr val="tx1"/>
+                </a:solidFill>
+              </a:defRPr>
+            </a:lvl4pPr>
+            <a:lvl5pPr>
+              <a:defRPr>
+                <a:solidFill>
+                  <a:schemeClr val="tx1"/>
+                </a:solidFill>
+              </a:defRPr>
+            </a:lvl5pPr>
+            <a:lvl6pPr>
+              <a:defRPr>
+                <a:solidFill>
+                  <a:schemeClr val="tx1"/>
+                </a:solidFill>
+              </a:defRPr>
+            </a:lvl6pPr>
+            <a:lvl7pPr>
+              <a:defRPr>
+                <a:solidFill>
+                  <a:schemeClr val="tx1"/>
+                </a:solidFill>
+              </a:defRPr>
+            </a:lvl7pPr>
+            <a:lvl8pPr>
+              <a:defRPr>
+                <a:solidFill>
+                  <a:schemeClr val="tx1"/>
+                </a:solidFill>
+              </a:defRPr>
+            </a:lvl8pPr>
+            <a:lvl9pPr>
+              <a:defRPr>
+                <a:solidFill>
+                  <a:schemeClr val="tx1"/>
+                </a:solidFill>
+              </a:defRPr>
+            </a:lvl9pPr>
+          </a:lstStyle>
+          <a:p>
+            <a:pPr algn="r"/>
+            <a:r>
+              <a:rPr lang="en-US" sz="900" dirty="0">
+                <a:solidFill>
+                  <a:schemeClr val="tx1"/>
+                </a:solidFill>
+                <a:latin typeface="Segoe UI Semibold" panose="020B0702040204020203" pitchFamily="34" charset="0"/>
+                <a:cs typeface="Segoe UI Semibold" panose="020B0702040204020203" pitchFamily="34" charset="0"/>
+              </a:rPr>
+              <a:t>Component Text</a:t>
+            </a:r>
+          </a:p>
+        </p:txBody>
+      </p:sp>
+      <p:sp>
+        <p:nvSpPr>
+          <p:cNvPr id="371" name="TextBox 370">
+            <a:extLst>
+              <a:ext uri="{FF2B5EF4-FFF2-40B4-BE49-F238E27FC236}">
+                <a16:creationId xmlns:a16="http://schemas.microsoft.com/office/drawing/2014/main" id="{F89CE314-4F24-4AE8-8372-27CA41B7957D}"/>
+              </a:ext>
+            </a:extLst>
+          </p:cNvPr>
+          <p:cNvSpPr txBox="1"/>
+          <p:nvPr/>
+        </p:nvSpPr>
+        <p:spPr>
+          <a:xfrm>
+            <a:off x="10503861" y="1297552"/>
+            <a:ext cx="949633" cy="663442"/>
+          </a:xfrm>
+          <a:prstGeom prst="rect">
+            <a:avLst/>
+          </a:prstGeom>
+          <a:noFill/>
+        </p:spPr>
+        <p:txBody>
+          <a:bodyPr wrap="square" lIns="91440" tIns="143347" rIns="91440" bIns="143347" rtlCol="0">
+            <a:spAutoFit/>
+          </a:bodyPr>
+          <a:lstStyle>
+            <a:defPPr>
+              <a:defRPr lang="en-US"/>
+            </a:defPPr>
+            <a:lvl1pPr defTabSz="913781">
+              <a:lnSpc>
+                <a:spcPct val="90000"/>
+              </a:lnSpc>
+              <a:spcBef>
+                <a:spcPct val="0"/>
+              </a:spcBef>
+              <a:spcAft>
+                <a:spcPts val="588"/>
+              </a:spcAft>
+              <a:defRPr sz="1125" kern="0" spc="-29">
+                <a:gradFill>
+                  <a:gsLst>
+                    <a:gs pos="1250">
+                      <a:schemeClr val="tx1"/>
+                    </a:gs>
+                    <a:gs pos="100000">
+                      <a:schemeClr val="tx1"/>
+                    </a:gs>
+                  </a:gsLst>
+                  <a:lin ang="5400000" scaled="0"/>
+                </a:gradFill>
+                <a:latin typeface="Segoe UI Semilight" panose="020B0402040204020203" pitchFamily="34" charset="0"/>
+                <a:ea typeface="MS PGothic" panose="020B0600070205080204" pitchFamily="34" charset="-128"/>
+                <a:cs typeface="Segoe UI Semilight" panose="020B0402040204020203" pitchFamily="34" charset="0"/>
+              </a:defRPr>
+            </a:lvl1pPr>
+            <a:lvl2pPr>
+              <a:defRPr>
+                <a:solidFill>
+                  <a:schemeClr val="tx1"/>
+                </a:solidFill>
+              </a:defRPr>
+            </a:lvl2pPr>
+            <a:lvl3pPr>
+              <a:defRPr>
+                <a:solidFill>
+                  <a:schemeClr val="tx1"/>
+                </a:solidFill>
+              </a:defRPr>
+            </a:lvl3pPr>
+            <a:lvl4pPr>
+              <a:defRPr>
+                <a:solidFill>
+                  <a:schemeClr val="tx1"/>
+                </a:solidFill>
+              </a:defRPr>
+            </a:lvl4pPr>
+            <a:lvl5pPr>
+              <a:defRPr>
+                <a:solidFill>
+                  <a:schemeClr val="tx1"/>
+                </a:solidFill>
+              </a:defRPr>
+            </a:lvl5pPr>
+            <a:lvl6pPr>
+              <a:defRPr>
+                <a:solidFill>
+                  <a:schemeClr val="tx1"/>
+                </a:solidFill>
+              </a:defRPr>
+            </a:lvl6pPr>
+            <a:lvl7pPr>
+              <a:defRPr>
+                <a:solidFill>
+                  <a:schemeClr val="tx1"/>
+                </a:solidFill>
+              </a:defRPr>
+            </a:lvl7pPr>
+            <a:lvl8pPr>
+              <a:defRPr>
+                <a:solidFill>
+                  <a:schemeClr val="tx1"/>
+                </a:solidFill>
+              </a:defRPr>
+            </a:lvl8pPr>
+            <a:lvl9pPr>
+              <a:defRPr>
+                <a:solidFill>
+                  <a:schemeClr val="tx1"/>
+                </a:solidFill>
+              </a:defRPr>
+            </a:lvl9pPr>
+          </a:lstStyle>
+          <a:p>
+            <a:pPr algn="ctr"/>
+            <a:r>
+              <a:rPr lang="en-US" sz="900" dirty="0">
+                <a:solidFill>
+                  <a:schemeClr val="tx1"/>
+                </a:solidFill>
+                <a:latin typeface="Segoe UI Semibold" panose="020B0702040204020203" pitchFamily="34" charset="0"/>
+                <a:cs typeface="Segoe UI Semibold" panose="020B0702040204020203" pitchFamily="34" charset="0"/>
+              </a:rPr>
+              <a:t>Azure Machine Learning Compute  </a:t>
+            </a:r>
+          </a:p>
+        </p:txBody>
+      </p:sp>
+      <p:sp>
+        <p:nvSpPr>
+          <p:cNvPr id="373" name="TextBox 372">
+            <a:extLst>
+              <a:ext uri="{FF2B5EF4-FFF2-40B4-BE49-F238E27FC236}">
+                <a16:creationId xmlns:a16="http://schemas.microsoft.com/office/drawing/2014/main" id="{E5EFB880-8DBE-4F96-9826-0AF8E2A863D8}"/>
+              </a:ext>
+            </a:extLst>
+          </p:cNvPr>
+          <p:cNvSpPr txBox="1"/>
+          <p:nvPr/>
+        </p:nvSpPr>
+        <p:spPr>
+          <a:xfrm>
+            <a:off x="10932227" y="405769"/>
+            <a:ext cx="1057149" cy="489365"/>
+          </a:xfrm>
+          <a:prstGeom prst="rect">
+            <a:avLst/>
+          </a:prstGeom>
+          <a:noFill/>
+        </p:spPr>
+        <p:txBody>
+          <a:bodyPr wrap="none" lIns="182880" tIns="146304" rIns="182880" bIns="146304" rtlCol="0">
+            <a:spAutoFit/>
+          </a:bodyPr>
+          <a:lstStyle/>
+          <a:p>
+            <a:pPr algn="r">
+              <a:lnSpc>
+                <a:spcPct val="90000"/>
+              </a:lnSpc>
+              <a:spcAft>
+                <a:spcPts val="600"/>
+              </a:spcAft>
+            </a:pPr>
+            <a:r>
+              <a:rPr lang="en-US" sz="1400" dirty="0">
+                <a:gradFill>
+                  <a:gsLst>
+                    <a:gs pos="2917">
+                      <a:schemeClr val="tx1"/>
+                    </a:gs>
+                    <a:gs pos="30000">
+                      <a:schemeClr val="tx1"/>
+                    </a:gs>
+                  </a:gsLst>
+                  <a:lin ang="5400000" scaled="0"/>
+                </a:gradFill>
+              </a:rPr>
+              <a:t>AUTO ML</a:t>
+            </a:r>
+          </a:p>
+        </p:txBody>
+      </p:sp>
+      <p:sp>
+        <p:nvSpPr>
+          <p:cNvPr id="374" name="Rectangle: Rounded Corners 373">
+            <a:extLst>
+              <a:ext uri="{FF2B5EF4-FFF2-40B4-BE49-F238E27FC236}">
+                <a16:creationId xmlns:a16="http://schemas.microsoft.com/office/drawing/2014/main" id="{9FA6DE41-98D7-4ACA-B264-285A9A57EE0B}"/>
+              </a:ext>
+            </a:extLst>
+          </p:cNvPr>
+          <p:cNvSpPr/>
+          <p:nvPr/>
+        </p:nvSpPr>
+        <p:spPr bwMode="auto">
+          <a:xfrm>
+            <a:off x="10075726" y="766596"/>
+            <a:ext cx="1805904" cy="1147710"/>
+          </a:xfrm>
+          <a:prstGeom prst="roundRect">
+            <a:avLst/>
+          </a:prstGeom>
+          <a:noFill/>
+          <a:ln>
+            <a:solidFill>
+              <a:srgbClr val="002060"/>
+            </a:solidFill>
+            <a:prstDash val="sysDash"/>
+            <a:headEnd type="none" w="med" len="med"/>
+            <a:tailEnd type="none" w="med" len="med"/>
+          </a:ln>
+          <a:effectLst/>
+        </p:spPr>
+        <p:style>
+          <a:lnRef idx="1">
+            <a:schemeClr val="accent2"/>
+          </a:lnRef>
+          <a:fillRef idx="3">
+            <a:schemeClr val="accent2"/>
+          </a:fillRef>
+          <a:effectRef idx="2">
+            <a:schemeClr val="accent2"/>
+          </a:effectRef>
+          <a:fontRef idx="minor">
+            <a:schemeClr val="lt1"/>
+          </a:fontRef>
+        </p:style>
+        <p:txBody>
+          <a:bodyPr rot="0" spcFirstLastPara="0" vertOverflow="overflow" horzOverflow="overflow" vert="horz" wrap="square" lIns="182880" tIns="146304" rIns="182880" bIns="146304" numCol="1" spcCol="0" rtlCol="0" fromWordArt="0" anchor="t" anchorCtr="0" forceAA="0" compatLnSpc="1">
+            <a:prstTxWarp prst="textNoShape">
+              <a:avLst/>
+            </a:prstTxWarp>
+            <a:noAutofit/>
+          </a:bodyPr>
+          <a:lstStyle/>
+          <a:p>
+            <a:pPr algn="ctr" defTabSz="932472" fontAlgn="base">
+              <a:lnSpc>
+                <a:spcPct val="90000"/>
+              </a:lnSpc>
+              <a:spcBef>
+                <a:spcPct val="0"/>
+              </a:spcBef>
+              <a:spcAft>
+                <a:spcPct val="0"/>
+              </a:spcAft>
+            </a:pPr>
+            <a:endParaRPr lang="en-US" sz="2400" dirty="0" err="1">
+              <a:gradFill>
+                <a:gsLst>
+                  <a:gs pos="0">
+                    <a:srgbClr val="FFFFFF"/>
+                  </a:gs>
+                  <a:gs pos="100000">
+                    <a:srgbClr val="FFFFFF"/>
+                  </a:gs>
+                </a:gsLst>
+                <a:lin ang="5400000" scaled="0"/>
+              </a:gradFill>
+              <a:ea typeface="Segoe UI" pitchFamily="34" charset="0"/>
+              <a:cs typeface="Segoe UI" pitchFamily="34" charset="0"/>
+            </a:endParaRPr>
+          </a:p>
+        </p:txBody>
+      </p:sp>
+      <p:sp>
+        <p:nvSpPr>
+          <p:cNvPr id="58" name="TextBox 57">
+            <a:extLst>
+              <a:ext uri="{FF2B5EF4-FFF2-40B4-BE49-F238E27FC236}">
+                <a16:creationId xmlns:a16="http://schemas.microsoft.com/office/drawing/2014/main" id="{9337A34E-9F86-406D-BB59-AEEAEBF007D5}"/>
+              </a:ext>
+            </a:extLst>
+          </p:cNvPr>
+          <p:cNvSpPr txBox="1"/>
+          <p:nvPr/>
+        </p:nvSpPr>
+        <p:spPr>
+          <a:xfrm>
+            <a:off x="2638714" y="3103632"/>
+            <a:ext cx="841980" cy="788092"/>
+          </a:xfrm>
+          <a:prstGeom prst="rect">
+            <a:avLst/>
+          </a:prstGeom>
+          <a:noFill/>
+        </p:spPr>
+        <p:txBody>
+          <a:bodyPr wrap="square" lIns="91440" tIns="143347" rIns="91440" bIns="143347" rtlCol="0">
+            <a:spAutoFit/>
+          </a:bodyPr>
+          <a:lstStyle>
+            <a:defPPr>
+              <a:defRPr lang="en-US"/>
+            </a:defPPr>
+            <a:lvl1pPr defTabSz="913781">
+              <a:lnSpc>
+                <a:spcPct val="90000"/>
+              </a:lnSpc>
+              <a:spcBef>
+                <a:spcPct val="0"/>
+              </a:spcBef>
+              <a:spcAft>
+                <a:spcPts val="588"/>
+              </a:spcAft>
+              <a:defRPr sz="1125" kern="0" spc="-29">
+                <a:gradFill>
+                  <a:gsLst>
+                    <a:gs pos="1250">
+                      <a:schemeClr val="tx1"/>
+                    </a:gs>
+                    <a:gs pos="100000">
+                      <a:schemeClr val="tx1"/>
+                    </a:gs>
+                  </a:gsLst>
+                  <a:lin ang="5400000" scaled="0"/>
+                </a:gradFill>
+                <a:latin typeface="Segoe UI Semilight" panose="020B0402040204020203" pitchFamily="34" charset="0"/>
+                <a:ea typeface="MS PGothic" panose="020B0600070205080204" pitchFamily="34" charset="-128"/>
+                <a:cs typeface="Segoe UI Semilight" panose="020B0402040204020203" pitchFamily="34" charset="0"/>
+              </a:defRPr>
+            </a:lvl1pPr>
+            <a:lvl2pPr>
+              <a:defRPr>
+                <a:solidFill>
+                  <a:schemeClr val="tx1"/>
+                </a:solidFill>
+              </a:defRPr>
+            </a:lvl2pPr>
+            <a:lvl3pPr>
+              <a:defRPr>
+                <a:solidFill>
+                  <a:schemeClr val="tx1"/>
+                </a:solidFill>
+              </a:defRPr>
+            </a:lvl3pPr>
+            <a:lvl4pPr>
+              <a:defRPr>
+                <a:solidFill>
+                  <a:schemeClr val="tx1"/>
+                </a:solidFill>
+              </a:defRPr>
+            </a:lvl4pPr>
+            <a:lvl5pPr>
+              <a:defRPr>
+                <a:solidFill>
+                  <a:schemeClr val="tx1"/>
+                </a:solidFill>
+              </a:defRPr>
+            </a:lvl5pPr>
+            <a:lvl6pPr>
+              <a:defRPr>
+                <a:solidFill>
+                  <a:schemeClr val="tx1"/>
+                </a:solidFill>
+              </a:defRPr>
+            </a:lvl6pPr>
+            <a:lvl7pPr>
+              <a:defRPr>
+                <a:solidFill>
+                  <a:schemeClr val="tx1"/>
+                </a:solidFill>
+              </a:defRPr>
+            </a:lvl7pPr>
+            <a:lvl8pPr>
+              <a:defRPr>
+                <a:solidFill>
+                  <a:schemeClr val="tx1"/>
+                </a:solidFill>
+              </a:defRPr>
+            </a:lvl8pPr>
+            <a:lvl9pPr>
+              <a:defRPr>
+                <a:solidFill>
+                  <a:schemeClr val="tx1"/>
+                </a:solidFill>
+              </a:defRPr>
+            </a:lvl9pPr>
+          </a:lstStyle>
+          <a:p>
+            <a:pPr algn="r"/>
+            <a:r>
+              <a:rPr lang="en-US" sz="900" dirty="0">
+                <a:solidFill>
+                  <a:schemeClr val="tx1"/>
+                </a:solidFill>
+                <a:latin typeface="Segoe UI Semibold" panose="020B0702040204020203" pitchFamily="34" charset="0"/>
+                <a:cs typeface="Segoe UI Semibold" panose="020B0702040204020203" pitchFamily="34" charset="0"/>
+              </a:rPr>
+              <a:t>Batch write messages to storage endpoint</a:t>
+            </a:r>
+          </a:p>
+        </p:txBody>
+      </p:sp>
+      <p:sp>
+        <p:nvSpPr>
+          <p:cNvPr id="76" name="TextBox 75">
+            <a:extLst>
+              <a:ext uri="{FF2B5EF4-FFF2-40B4-BE49-F238E27FC236}">
+                <a16:creationId xmlns:a16="http://schemas.microsoft.com/office/drawing/2014/main" id="{6FBD5C65-C995-407F-91EF-4E9A1500C055}"/>
+              </a:ext>
+            </a:extLst>
+          </p:cNvPr>
+          <p:cNvSpPr txBox="1"/>
+          <p:nvPr/>
+        </p:nvSpPr>
+        <p:spPr>
+          <a:xfrm>
+            <a:off x="5491096" y="2417140"/>
+            <a:ext cx="841980" cy="538793"/>
+          </a:xfrm>
+          <a:prstGeom prst="rect">
+            <a:avLst/>
+          </a:prstGeom>
+          <a:noFill/>
+        </p:spPr>
+        <p:txBody>
+          <a:bodyPr wrap="square" lIns="91440" tIns="143347" rIns="91440" bIns="143347" rtlCol="0">
+            <a:spAutoFit/>
+          </a:bodyPr>
+          <a:lstStyle>
+            <a:defPPr>
+              <a:defRPr lang="en-US"/>
+            </a:defPPr>
+            <a:lvl1pPr defTabSz="913781">
+              <a:lnSpc>
+                <a:spcPct val="90000"/>
+              </a:lnSpc>
+              <a:spcBef>
+                <a:spcPct val="0"/>
+              </a:spcBef>
+              <a:spcAft>
+                <a:spcPts val="588"/>
+              </a:spcAft>
+              <a:defRPr sz="1125" kern="0" spc="-29">
+                <a:gradFill>
+                  <a:gsLst>
+                    <a:gs pos="1250">
+                      <a:schemeClr val="tx1"/>
+                    </a:gs>
+                    <a:gs pos="100000">
+                      <a:schemeClr val="tx1"/>
+                    </a:gs>
+                  </a:gsLst>
+                  <a:lin ang="5400000" scaled="0"/>
+                </a:gradFill>
+                <a:latin typeface="Segoe UI Semilight" panose="020B0402040204020203" pitchFamily="34" charset="0"/>
+                <a:ea typeface="MS PGothic" panose="020B0600070205080204" pitchFamily="34" charset="-128"/>
+                <a:cs typeface="Segoe UI Semilight" panose="020B0402040204020203" pitchFamily="34" charset="0"/>
+              </a:defRPr>
+            </a:lvl1pPr>
+            <a:lvl2pPr>
+              <a:defRPr>
+                <a:solidFill>
+                  <a:schemeClr val="tx1"/>
+                </a:solidFill>
+              </a:defRPr>
+            </a:lvl2pPr>
+            <a:lvl3pPr>
+              <a:defRPr>
+                <a:solidFill>
+                  <a:schemeClr val="tx1"/>
+                </a:solidFill>
+              </a:defRPr>
+            </a:lvl3pPr>
+            <a:lvl4pPr>
+              <a:defRPr>
+                <a:solidFill>
+                  <a:schemeClr val="tx1"/>
+                </a:solidFill>
+              </a:defRPr>
+            </a:lvl4pPr>
+            <a:lvl5pPr>
+              <a:defRPr>
+                <a:solidFill>
+                  <a:schemeClr val="tx1"/>
+                </a:solidFill>
+              </a:defRPr>
+            </a:lvl5pPr>
+            <a:lvl6pPr>
+              <a:defRPr>
+                <a:solidFill>
+                  <a:schemeClr val="tx1"/>
+                </a:solidFill>
+              </a:defRPr>
+            </a:lvl6pPr>
+            <a:lvl7pPr>
+              <a:defRPr>
+                <a:solidFill>
+                  <a:schemeClr val="tx1"/>
+                </a:solidFill>
+              </a:defRPr>
+            </a:lvl7pPr>
+            <a:lvl8pPr>
+              <a:defRPr>
+                <a:solidFill>
+                  <a:schemeClr val="tx1"/>
+                </a:solidFill>
+              </a:defRPr>
+            </a:lvl8pPr>
+            <a:lvl9pPr>
+              <a:defRPr>
+                <a:solidFill>
+                  <a:schemeClr val="tx1"/>
+                </a:solidFill>
+              </a:defRPr>
+            </a:lvl9pPr>
+          </a:lstStyle>
+          <a:p>
+            <a:r>
+              <a:rPr lang="en-US" sz="900" dirty="0">
+                <a:solidFill>
+                  <a:schemeClr val="tx1"/>
+                </a:solidFill>
+                <a:latin typeface="Segoe UI Semibold" panose="020B0702040204020203" pitchFamily="34" charset="0"/>
+                <a:cs typeface="Segoe UI Semibold" panose="020B0702040204020203" pitchFamily="34" charset="0"/>
+              </a:rPr>
+              <a:t>Historical</a:t>
+            </a:r>
+            <a:br>
+              <a:rPr lang="en-US" sz="900" dirty="0">
+                <a:solidFill>
+                  <a:schemeClr val="tx1"/>
+                </a:solidFill>
+                <a:latin typeface="Segoe UI Semibold" panose="020B0702040204020203" pitchFamily="34" charset="0"/>
+                <a:cs typeface="Segoe UI Semibold" panose="020B0702040204020203" pitchFamily="34" charset="0"/>
+              </a:rPr>
+            </a:br>
+            <a:r>
+              <a:rPr lang="en-US" sz="900" dirty="0">
+                <a:solidFill>
+                  <a:schemeClr val="tx1"/>
+                </a:solidFill>
+                <a:latin typeface="Segoe UI Semibold" panose="020B0702040204020203" pitchFamily="34" charset="0"/>
+                <a:cs typeface="Segoe UI Semibold" panose="020B0702040204020203" pitchFamily="34" charset="0"/>
+              </a:rPr>
+              <a:t>data</a:t>
+            </a:r>
+          </a:p>
+        </p:txBody>
+      </p:sp>
+      <p:sp>
+        <p:nvSpPr>
+          <p:cNvPr id="96" name="Rectangle 95">
+            <a:extLst>
+              <a:ext uri="{FF2B5EF4-FFF2-40B4-BE49-F238E27FC236}">
+                <a16:creationId xmlns:a16="http://schemas.microsoft.com/office/drawing/2014/main" id="{B13AFD7C-4748-40AC-9708-E3ED009A8587}"/>
+              </a:ext>
+            </a:extLst>
+          </p:cNvPr>
+          <p:cNvSpPr/>
+          <p:nvPr/>
+        </p:nvSpPr>
+        <p:spPr>
+          <a:xfrm>
+            <a:off x="1652575" y="3639388"/>
+            <a:ext cx="477314" cy="109239"/>
+          </a:xfrm>
+          <a:prstGeom prst="rect">
+            <a:avLst/>
+          </a:prstGeom>
+          <a:noFill/>
+          <a:ln>
+            <a:noFill/>
+          </a:ln>
+        </p:spPr>
+        <p:style>
+          <a:lnRef idx="2">
+            <a:schemeClr val="accent1">
+              <a:shade val="50000"/>
+            </a:schemeClr>
+          </a:lnRef>
+          <a:fillRef idx="1">
+            <a:schemeClr val="accent1"/>
+          </a:fillRef>
+          <a:effectRef idx="0">
+            <a:schemeClr val="accent1"/>
+          </a:effectRef>
+          <a:fontRef idx="minor">
+            <a:schemeClr val="lt1"/>
+          </a:fontRef>
+        </p:style>
+        <p:txBody>
+          <a:bodyPr rtlCol="0" anchor="ctr"/>
+          <a:lstStyle/>
+          <a:p>
+            <a:pPr algn="ctr"/>
+            <a:endParaRPr lang="en-US"/>
+          </a:p>
+        </p:txBody>
+      </p:sp>
+      <p:cxnSp>
+        <p:nvCxnSpPr>
+          <p:cNvPr id="120" name="Connector: Elbow 119">
+            <a:extLst>
+              <a:ext uri="{FF2B5EF4-FFF2-40B4-BE49-F238E27FC236}">
+                <a16:creationId xmlns:a16="http://schemas.microsoft.com/office/drawing/2014/main" id="{87F7EE9E-95CE-46A5-8A35-9407A072F6C9}"/>
+              </a:ext>
+            </a:extLst>
+          </p:cNvPr>
+          <p:cNvCxnSpPr>
+            <a:cxnSpLocks/>
+          </p:cNvCxnSpPr>
+          <p:nvPr/>
+        </p:nvCxnSpPr>
+        <p:spPr>
+          <a:xfrm rot="16200000" flipH="1">
+            <a:off x="6295112" y="3054568"/>
+            <a:ext cx="3138970" cy="908838"/>
+          </a:xfrm>
+          <a:prstGeom prst="bentConnector3">
+            <a:avLst>
+              <a:gd name="adj1" fmla="val 100000"/>
+            </a:avLst>
+          </a:prstGeom>
+          <a:ln>
+            <a:solidFill>
+              <a:schemeClr val="tx1">
+                <a:lumMod val="50000"/>
+                <a:lumOff val="50000"/>
+              </a:schemeClr>
+            </a:solidFill>
+            <a:tailEnd type="triangle"/>
+          </a:ln>
+        </p:spPr>
+        <p:style>
+          <a:lnRef idx="1">
+            <a:schemeClr val="accent1"/>
+          </a:lnRef>
+          <a:fillRef idx="0">
+            <a:schemeClr val="accent1"/>
+          </a:fillRef>
+          <a:effectRef idx="0">
+            <a:schemeClr val="accent1"/>
+          </a:effectRef>
+          <a:fontRef idx="minor">
+            <a:schemeClr val="tx1"/>
+          </a:fontRef>
+        </p:style>
+      </p:cxnSp>
+      <p:pic>
+        <p:nvPicPr>
+          <p:cNvPr id="6" name="Picture 5">
+            <a:extLst>
+              <a:ext uri="{FF2B5EF4-FFF2-40B4-BE49-F238E27FC236}">
+                <a16:creationId xmlns:a16="http://schemas.microsoft.com/office/drawing/2014/main" id="{73F51056-BCC7-4DFF-BDFB-163AE3D5F96D}"/>
+              </a:ext>
+            </a:extLst>
+          </p:cNvPr>
+          <p:cNvPicPr>
+            <a:picLocks noChangeAspect="1"/>
+          </p:cNvPicPr>
+          <p:nvPr/>
+        </p:nvPicPr>
+        <p:blipFill>
+          <a:blip r:embed="rId9"/>
+          <a:stretch>
+            <a:fillRect/>
+          </a:stretch>
+        </p:blipFill>
+        <p:spPr>
+          <a:xfrm>
+            <a:off x="7855088" y="805262"/>
+            <a:ext cx="618721" cy="598632"/>
+          </a:xfrm>
+          <a:prstGeom prst="rect">
+            <a:avLst/>
+          </a:prstGeom>
+        </p:spPr>
+      </p:pic>
+      <p:pic>
+        <p:nvPicPr>
+          <p:cNvPr id="97" name="Picture 96">
+            <a:extLst>
+              <a:ext uri="{FF2B5EF4-FFF2-40B4-BE49-F238E27FC236}">
+                <a16:creationId xmlns:a16="http://schemas.microsoft.com/office/drawing/2014/main" id="{DFA7B80E-22CE-4D02-9EE5-DDE56892FDF0}"/>
+              </a:ext>
+            </a:extLst>
+          </p:cNvPr>
+          <p:cNvPicPr>
+            <a:picLocks noChangeAspect="1"/>
+          </p:cNvPicPr>
+          <p:nvPr/>
+        </p:nvPicPr>
+        <p:blipFill>
+          <a:blip r:embed="rId9"/>
+          <a:stretch>
+            <a:fillRect/>
+          </a:stretch>
+        </p:blipFill>
+        <p:spPr>
+          <a:xfrm>
+            <a:off x="10669316" y="815014"/>
+            <a:ext cx="618721" cy="598632"/>
+          </a:xfrm>
+          <a:prstGeom prst="rect">
+            <a:avLst/>
+          </a:prstGeom>
+        </p:spPr>
+      </p:pic>
+      <p:cxnSp>
+        <p:nvCxnSpPr>
+          <p:cNvPr id="98" name="Connector: Elbow 97">
+            <a:extLst>
+              <a:ext uri="{FF2B5EF4-FFF2-40B4-BE49-F238E27FC236}">
+                <a16:creationId xmlns:a16="http://schemas.microsoft.com/office/drawing/2014/main" id="{A64EBA5B-EE8F-48E8-B92E-F3E9D83DAC97}"/>
+              </a:ext>
+            </a:extLst>
+          </p:cNvPr>
+          <p:cNvCxnSpPr>
+            <a:cxnSpLocks/>
+            <a:endCxn id="374" idx="0"/>
+          </p:cNvCxnSpPr>
+          <p:nvPr/>
+        </p:nvCxnSpPr>
+        <p:spPr>
+          <a:xfrm flipV="1">
+            <a:off x="4381653" y="766596"/>
+            <a:ext cx="6597025" cy="1826159"/>
+          </a:xfrm>
+          <a:prstGeom prst="bentConnector4">
+            <a:avLst>
+              <a:gd name="adj1" fmla="val -81"/>
+              <a:gd name="adj2" fmla="val 129707"/>
+            </a:avLst>
+          </a:prstGeom>
+          <a:ln>
+            <a:solidFill>
+              <a:schemeClr val="tx1">
+                <a:lumMod val="50000"/>
+                <a:lumOff val="50000"/>
+              </a:schemeClr>
+            </a:solidFill>
+            <a:tailEnd type="triangle"/>
+          </a:ln>
+        </p:spPr>
+        <p:style>
+          <a:lnRef idx="1">
+            <a:schemeClr val="accent1"/>
+          </a:lnRef>
+          <a:fillRef idx="0">
+            <a:schemeClr val="accent1"/>
+          </a:fillRef>
+          <a:effectRef idx="0">
+            <a:schemeClr val="accent1"/>
+          </a:effectRef>
+          <a:fontRef idx="minor">
+            <a:schemeClr val="tx1"/>
+          </a:fontRef>
+        </p:style>
+      </p:cxnSp>
+      <p:cxnSp>
+        <p:nvCxnSpPr>
+          <p:cNvPr id="114" name="Connector: Elbow 113">
+            <a:extLst>
+              <a:ext uri="{FF2B5EF4-FFF2-40B4-BE49-F238E27FC236}">
+                <a16:creationId xmlns:a16="http://schemas.microsoft.com/office/drawing/2014/main" id="{3610FC6B-CAD1-4BEA-A875-1320013BDD35}"/>
+              </a:ext>
+            </a:extLst>
+          </p:cNvPr>
+          <p:cNvCxnSpPr>
+            <a:cxnSpLocks/>
+          </p:cNvCxnSpPr>
+          <p:nvPr/>
+        </p:nvCxnSpPr>
+        <p:spPr>
+          <a:xfrm>
+            <a:off x="5241887" y="3459942"/>
+            <a:ext cx="3067641" cy="1770076"/>
+          </a:xfrm>
+          <a:prstGeom prst="bentConnector3">
+            <a:avLst>
+              <a:gd name="adj1" fmla="val 18147"/>
+            </a:avLst>
+          </a:prstGeom>
+          <a:ln>
+            <a:solidFill>
+              <a:schemeClr val="tx1">
+                <a:lumMod val="50000"/>
+                <a:lumOff val="50000"/>
+              </a:schemeClr>
+            </a:solidFill>
+            <a:tailEnd type="triangle"/>
+          </a:ln>
+        </p:spPr>
+        <p:style>
+          <a:lnRef idx="1">
+            <a:schemeClr val="accent1"/>
+          </a:lnRef>
+          <a:fillRef idx="0">
+            <a:schemeClr val="accent1"/>
+          </a:fillRef>
+          <a:effectRef idx="0">
+            <a:schemeClr val="accent1"/>
+          </a:effectRef>
+          <a:fontRef idx="minor">
+            <a:schemeClr val="tx1"/>
+          </a:fontRef>
+        </p:style>
+      </p:cxnSp>
+      <p:cxnSp>
+        <p:nvCxnSpPr>
+          <p:cNvPr id="132" name="Connector: Elbow 131">
+            <a:extLst>
+              <a:ext uri="{FF2B5EF4-FFF2-40B4-BE49-F238E27FC236}">
+                <a16:creationId xmlns:a16="http://schemas.microsoft.com/office/drawing/2014/main" id="{651D1FD3-15A8-4D83-BC16-620C7EC7BBEA}"/>
+              </a:ext>
+            </a:extLst>
+          </p:cNvPr>
+          <p:cNvCxnSpPr>
+            <a:cxnSpLocks/>
+          </p:cNvCxnSpPr>
+          <p:nvPr/>
+        </p:nvCxnSpPr>
+        <p:spPr>
+          <a:xfrm>
+            <a:off x="5244905" y="3327762"/>
+            <a:ext cx="3044757" cy="760014"/>
+          </a:xfrm>
+          <a:prstGeom prst="bentConnector3">
+            <a:avLst>
+              <a:gd name="adj1" fmla="val 50000"/>
+            </a:avLst>
+          </a:prstGeom>
+          <a:ln>
+            <a:solidFill>
+              <a:schemeClr val="tx1">
+                <a:lumMod val="50000"/>
+                <a:lumOff val="50000"/>
+              </a:schemeClr>
+            </a:solidFill>
+            <a:tailEnd type="triangle"/>
+          </a:ln>
+        </p:spPr>
+        <p:style>
+          <a:lnRef idx="1">
+            <a:schemeClr val="accent1"/>
+          </a:lnRef>
+          <a:fillRef idx="0">
+            <a:schemeClr val="accent1"/>
+          </a:fillRef>
+          <a:effectRef idx="0">
+            <a:schemeClr val="accent1"/>
+          </a:effectRef>
+          <a:fontRef idx="minor">
+            <a:schemeClr val="tx1"/>
+          </a:fontRef>
+        </p:style>
+      </p:cxnSp>
+      <p:sp>
+        <p:nvSpPr>
+          <p:cNvPr id="135" name="Rectangle: Rounded Corners 134">
+            <a:extLst>
+              <a:ext uri="{FF2B5EF4-FFF2-40B4-BE49-F238E27FC236}">
+                <a16:creationId xmlns:a16="http://schemas.microsoft.com/office/drawing/2014/main" id="{DE34650B-2A94-4A75-8E9B-98A6C0669A1F}"/>
+              </a:ext>
+            </a:extLst>
+          </p:cNvPr>
+          <p:cNvSpPr/>
+          <p:nvPr/>
+        </p:nvSpPr>
+        <p:spPr bwMode="auto">
+          <a:xfrm>
+            <a:off x="7517575" y="2269790"/>
+            <a:ext cx="2986286" cy="642142"/>
+          </a:xfrm>
+          <a:prstGeom prst="roundRect">
+            <a:avLst/>
+          </a:prstGeom>
+          <a:noFill/>
+          <a:ln>
+            <a:solidFill>
+              <a:srgbClr val="002060"/>
+            </a:solidFill>
+            <a:prstDash val="sysDash"/>
+            <a:headEnd type="none" w="med" len="med"/>
+            <a:tailEnd type="none" w="med" len="med"/>
+          </a:ln>
+          <a:effectLst/>
+        </p:spPr>
+        <p:style>
+          <a:lnRef idx="1">
+            <a:schemeClr val="accent2"/>
+          </a:lnRef>
+          <a:fillRef idx="3">
+            <a:schemeClr val="accent2"/>
+          </a:fillRef>
+          <a:effectRef idx="2">
+            <a:schemeClr val="accent2"/>
+          </a:effectRef>
+          <a:fontRef idx="minor">
+            <a:schemeClr val="lt1"/>
+          </a:fontRef>
+        </p:style>
+        <p:txBody>
+          <a:bodyPr rot="0" spcFirstLastPara="0" vertOverflow="overflow" horzOverflow="overflow" vert="horz" wrap="square" lIns="182880" tIns="146304" rIns="182880" bIns="146304" numCol="1" spcCol="0" rtlCol="0" fromWordArt="0" anchor="t" anchorCtr="0" forceAA="0" compatLnSpc="1">
+            <a:prstTxWarp prst="textNoShape">
+              <a:avLst/>
+            </a:prstTxWarp>
+            <a:noAutofit/>
+          </a:bodyPr>
+          <a:lstStyle/>
+          <a:p>
+            <a:pPr algn="ctr" defTabSz="932472" fontAlgn="base">
+              <a:lnSpc>
+                <a:spcPct val="90000"/>
+              </a:lnSpc>
+              <a:spcBef>
+                <a:spcPct val="0"/>
+              </a:spcBef>
+              <a:spcAft>
+                <a:spcPct val="0"/>
+              </a:spcAft>
+            </a:pPr>
+            <a:endParaRPr lang="en-US" sz="2400" dirty="0" err="1">
+              <a:gradFill>
+                <a:gsLst>
+                  <a:gs pos="0">
+                    <a:srgbClr val="FFFFFF"/>
+                  </a:gs>
+                  <a:gs pos="100000">
+                    <a:srgbClr val="FFFFFF"/>
+                  </a:gs>
+                </a:gsLst>
+                <a:lin ang="5400000" scaled="0"/>
+              </a:gradFill>
+              <a:ea typeface="Segoe UI" pitchFamily="34" charset="0"/>
+              <a:cs typeface="Segoe UI" pitchFamily="34" charset="0"/>
+            </a:endParaRPr>
+          </a:p>
+        </p:txBody>
+      </p:sp>
+      <p:pic>
+        <p:nvPicPr>
+          <p:cNvPr id="53" name="Picture 52">
+            <a:extLst>
+              <a:ext uri="{FF2B5EF4-FFF2-40B4-BE49-F238E27FC236}">
+                <a16:creationId xmlns:a16="http://schemas.microsoft.com/office/drawing/2014/main" id="{DE6CF9CE-87EE-4590-8FF7-31378A8BA054}"/>
+              </a:ext>
+            </a:extLst>
+          </p:cNvPr>
+          <p:cNvPicPr>
+            <a:picLocks noChangeAspect="1"/>
+          </p:cNvPicPr>
+          <p:nvPr/>
+        </p:nvPicPr>
+        <p:blipFill>
+          <a:blip r:embed="rId10"/>
+          <a:stretch>
+            <a:fillRect/>
+          </a:stretch>
+        </p:blipFill>
+        <p:spPr>
+          <a:xfrm>
+            <a:off x="7691043" y="2319893"/>
+            <a:ext cx="696893" cy="524020"/>
+          </a:xfrm>
+          <a:prstGeom prst="rect">
+            <a:avLst/>
+          </a:prstGeom>
+        </p:spPr>
+      </p:pic>
+      <p:pic>
+        <p:nvPicPr>
+          <p:cNvPr id="137" name="Picture 136">
+            <a:extLst>
+              <a:ext uri="{FF2B5EF4-FFF2-40B4-BE49-F238E27FC236}">
+                <a16:creationId xmlns:a16="http://schemas.microsoft.com/office/drawing/2014/main" id="{F4355627-76CE-4135-9F04-49214CE402DB}"/>
+              </a:ext>
+            </a:extLst>
+          </p:cNvPr>
+          <p:cNvPicPr>
+            <a:picLocks noChangeAspect="1"/>
+          </p:cNvPicPr>
+          <p:nvPr/>
+        </p:nvPicPr>
+        <p:blipFill>
+          <a:blip r:embed="rId10"/>
+          <a:stretch>
+            <a:fillRect/>
+          </a:stretch>
+        </p:blipFill>
+        <p:spPr>
+          <a:xfrm>
+            <a:off x="8444054" y="2343153"/>
+            <a:ext cx="696893" cy="524020"/>
+          </a:xfrm>
+          <a:prstGeom prst="rect">
+            <a:avLst/>
+          </a:prstGeom>
+        </p:spPr>
+      </p:pic>
+      <p:sp>
+        <p:nvSpPr>
+          <p:cNvPr id="138" name="TextBox 137">
+            <a:extLst>
+              <a:ext uri="{FF2B5EF4-FFF2-40B4-BE49-F238E27FC236}">
+                <a16:creationId xmlns:a16="http://schemas.microsoft.com/office/drawing/2014/main" id="{83EE0ADD-5F40-4CF6-8642-0FD0268AE765}"/>
+              </a:ext>
+            </a:extLst>
+          </p:cNvPr>
+          <p:cNvSpPr txBox="1"/>
+          <p:nvPr/>
+        </p:nvSpPr>
+        <p:spPr>
+          <a:xfrm>
+            <a:off x="7973310" y="1929154"/>
+            <a:ext cx="2204450" cy="489365"/>
+          </a:xfrm>
+          <a:prstGeom prst="rect">
+            <a:avLst/>
+          </a:prstGeom>
+          <a:noFill/>
+        </p:spPr>
+        <p:txBody>
+          <a:bodyPr wrap="none" lIns="182880" tIns="146304" rIns="182880" bIns="146304" rtlCol="0">
+            <a:spAutoFit/>
+          </a:bodyPr>
+          <a:lstStyle/>
+          <a:p>
+            <a:pPr algn="r">
+              <a:lnSpc>
+                <a:spcPct val="90000"/>
+              </a:lnSpc>
+              <a:spcAft>
+                <a:spcPts val="600"/>
+              </a:spcAft>
+            </a:pPr>
+            <a:r>
+              <a:rPr lang="en-US" sz="1400" dirty="0">
+                <a:gradFill>
+                  <a:gsLst>
+                    <a:gs pos="2917">
+                      <a:schemeClr val="tx1"/>
+                    </a:gs>
+                    <a:gs pos="30000">
+                      <a:schemeClr val="tx1"/>
+                    </a:gs>
+                  </a:gsLst>
+                  <a:lin ang="5400000" scaled="0"/>
+                </a:gradFill>
+              </a:rPr>
+              <a:t>REAL-TIME INFERENCING</a:t>
+            </a:r>
+          </a:p>
+        </p:txBody>
+      </p:sp>
+      <p:sp>
+        <p:nvSpPr>
+          <p:cNvPr id="139" name="Rectangle 138">
+            <a:extLst>
+              <a:ext uri="{FF2B5EF4-FFF2-40B4-BE49-F238E27FC236}">
+                <a16:creationId xmlns:a16="http://schemas.microsoft.com/office/drawing/2014/main" id="{208D55D9-36BB-41AF-AAC9-316C7379A135}"/>
+              </a:ext>
+            </a:extLst>
+          </p:cNvPr>
+          <p:cNvSpPr/>
+          <p:nvPr/>
+        </p:nvSpPr>
+        <p:spPr>
+          <a:xfrm>
+            <a:off x="9161471" y="2353829"/>
+            <a:ext cx="1306760" cy="507831"/>
+          </a:xfrm>
+          <a:prstGeom prst="rect">
+            <a:avLst/>
+          </a:prstGeom>
+        </p:spPr>
+        <p:txBody>
+          <a:bodyPr wrap="square">
+            <a:spAutoFit/>
+          </a:bodyPr>
+          <a:lstStyle/>
+          <a:p>
+            <a:pPr algn="ctr" defTabSz="950973"/>
+            <a:r>
+              <a:rPr lang="en-US" sz="900" kern="0" dirty="0">
+                <a:latin typeface="Segoe UI Semibold" panose="020B0702040204020203" pitchFamily="34" charset="0"/>
+                <a:ea typeface="MS PGothic" panose="020B0600070205080204" pitchFamily="34" charset="-128"/>
+                <a:cs typeface="Segoe UI Semibold" panose="020B0702040204020203" pitchFamily="34" charset="0"/>
+              </a:rPr>
+              <a:t>Azure</a:t>
+            </a:r>
+          </a:p>
+          <a:p>
+            <a:pPr algn="ctr" defTabSz="950973"/>
+            <a:r>
+              <a:rPr lang="en-US" sz="900" kern="0" dirty="0">
+                <a:latin typeface="Segoe UI Semibold" panose="020B0702040204020203" pitchFamily="34" charset="0"/>
+                <a:ea typeface="MS PGothic" panose="020B0600070205080204" pitchFamily="34" charset="-128"/>
+                <a:cs typeface="Segoe UI Semibold" panose="020B0702040204020203" pitchFamily="34" charset="0"/>
+              </a:rPr>
+              <a:t>Kubernetes</a:t>
+            </a:r>
+          </a:p>
+          <a:p>
+            <a:pPr algn="ctr" defTabSz="950973"/>
+            <a:r>
+              <a:rPr lang="en-US" sz="900" kern="0" dirty="0">
+                <a:latin typeface="Segoe UI Semibold" panose="020B0702040204020203" pitchFamily="34" charset="0"/>
+                <a:ea typeface="MS PGothic" panose="020B0600070205080204" pitchFamily="34" charset="-128"/>
+                <a:cs typeface="Segoe UI Semibold" panose="020B0702040204020203" pitchFamily="34" charset="0"/>
+              </a:rPr>
+              <a:t>Service</a:t>
+            </a:r>
+          </a:p>
+        </p:txBody>
+      </p:sp>
+      <p:cxnSp>
+        <p:nvCxnSpPr>
+          <p:cNvPr id="140" name="Straight Arrow Connector 139">
+            <a:extLst>
+              <a:ext uri="{FF2B5EF4-FFF2-40B4-BE49-F238E27FC236}">
+                <a16:creationId xmlns:a16="http://schemas.microsoft.com/office/drawing/2014/main" id="{36C5A12D-0DE4-4F7F-8378-B2CACC0E9F26}"/>
+              </a:ext>
+            </a:extLst>
+          </p:cNvPr>
+          <p:cNvCxnSpPr>
+            <a:cxnSpLocks/>
+            <a:stCxn id="239" idx="2"/>
+          </p:cNvCxnSpPr>
+          <p:nvPr/>
+        </p:nvCxnSpPr>
+        <p:spPr>
+          <a:xfrm flipH="1">
+            <a:off x="8109782" y="1934027"/>
+            <a:ext cx="53382" cy="337031"/>
+          </a:xfrm>
+          <a:prstGeom prst="straightConnector1">
+            <a:avLst/>
+          </a:prstGeom>
+          <a:ln>
+            <a:tailEnd type="triangle"/>
+          </a:ln>
+        </p:spPr>
+        <p:style>
+          <a:lnRef idx="1">
+            <a:schemeClr val="accent1"/>
+          </a:lnRef>
+          <a:fillRef idx="0">
+            <a:schemeClr val="accent1"/>
+          </a:fillRef>
+          <a:effectRef idx="0">
+            <a:schemeClr val="accent1"/>
+          </a:effectRef>
+          <a:fontRef idx="minor">
+            <a:schemeClr val="tx1"/>
+          </a:fontRef>
+        </p:style>
+      </p:cxnSp>
+      <p:sp>
+        <p:nvSpPr>
+          <p:cNvPr id="144" name="TextBox 143">
+            <a:extLst>
+              <a:ext uri="{FF2B5EF4-FFF2-40B4-BE49-F238E27FC236}">
+                <a16:creationId xmlns:a16="http://schemas.microsoft.com/office/drawing/2014/main" id="{A963BF03-EFD9-4AC0-9A79-F4B9D2E1E919}"/>
+              </a:ext>
+            </a:extLst>
+          </p:cNvPr>
+          <p:cNvSpPr txBox="1"/>
+          <p:nvPr/>
+        </p:nvSpPr>
+        <p:spPr>
+          <a:xfrm>
+            <a:off x="7300653" y="1829852"/>
+            <a:ext cx="841980" cy="538793"/>
+          </a:xfrm>
+          <a:prstGeom prst="rect">
+            <a:avLst/>
+          </a:prstGeom>
+          <a:noFill/>
+        </p:spPr>
+        <p:txBody>
+          <a:bodyPr wrap="square" lIns="91440" tIns="143347" rIns="91440" bIns="143347" rtlCol="0">
+            <a:spAutoFit/>
+          </a:bodyPr>
+          <a:lstStyle>
+            <a:defPPr>
+              <a:defRPr lang="en-US"/>
+            </a:defPPr>
+            <a:lvl1pPr defTabSz="913781">
+              <a:lnSpc>
+                <a:spcPct val="90000"/>
+              </a:lnSpc>
+              <a:spcBef>
+                <a:spcPct val="0"/>
+              </a:spcBef>
+              <a:spcAft>
+                <a:spcPts val="588"/>
+              </a:spcAft>
+              <a:defRPr sz="1125" kern="0" spc="-29">
+                <a:gradFill>
+                  <a:gsLst>
+                    <a:gs pos="1250">
+                      <a:schemeClr val="tx1"/>
+                    </a:gs>
+                    <a:gs pos="100000">
+                      <a:schemeClr val="tx1"/>
+                    </a:gs>
+                  </a:gsLst>
+                  <a:lin ang="5400000" scaled="0"/>
+                </a:gradFill>
+                <a:latin typeface="Segoe UI Semilight" panose="020B0402040204020203" pitchFamily="34" charset="0"/>
+                <a:ea typeface="MS PGothic" panose="020B0600070205080204" pitchFamily="34" charset="-128"/>
+                <a:cs typeface="Segoe UI Semilight" panose="020B0402040204020203" pitchFamily="34" charset="0"/>
+              </a:defRPr>
+            </a:lvl1pPr>
+            <a:lvl2pPr>
+              <a:defRPr>
+                <a:solidFill>
+                  <a:schemeClr val="tx1"/>
+                </a:solidFill>
+              </a:defRPr>
+            </a:lvl2pPr>
+            <a:lvl3pPr>
+              <a:defRPr>
+                <a:solidFill>
+                  <a:schemeClr val="tx1"/>
+                </a:solidFill>
+              </a:defRPr>
+            </a:lvl3pPr>
+            <a:lvl4pPr>
+              <a:defRPr>
+                <a:solidFill>
+                  <a:schemeClr val="tx1"/>
+                </a:solidFill>
+              </a:defRPr>
+            </a:lvl4pPr>
+            <a:lvl5pPr>
+              <a:defRPr>
+                <a:solidFill>
+                  <a:schemeClr val="tx1"/>
+                </a:solidFill>
+              </a:defRPr>
+            </a:lvl5pPr>
+            <a:lvl6pPr>
+              <a:defRPr>
+                <a:solidFill>
+                  <a:schemeClr val="tx1"/>
+                </a:solidFill>
+              </a:defRPr>
+            </a:lvl6pPr>
+            <a:lvl7pPr>
+              <a:defRPr>
+                <a:solidFill>
+                  <a:schemeClr val="tx1"/>
+                </a:solidFill>
+              </a:defRPr>
+            </a:lvl7pPr>
+            <a:lvl8pPr>
+              <a:defRPr>
+                <a:solidFill>
+                  <a:schemeClr val="tx1"/>
+                </a:solidFill>
+              </a:defRPr>
+            </a:lvl8pPr>
+            <a:lvl9pPr>
+              <a:defRPr>
+                <a:solidFill>
+                  <a:schemeClr val="tx1"/>
+                </a:solidFill>
+              </a:defRPr>
+            </a:lvl9pPr>
+          </a:lstStyle>
+          <a:p>
+            <a:pPr algn="r"/>
+            <a:r>
+              <a:rPr lang="en-US" sz="900" dirty="0">
+                <a:solidFill>
+                  <a:schemeClr val="tx1"/>
+                </a:solidFill>
+                <a:latin typeface="Segoe UI Semibold" panose="020B0702040204020203" pitchFamily="34" charset="0"/>
+                <a:cs typeface="Segoe UI Semibold" panose="020B0702040204020203" pitchFamily="34" charset="0"/>
+              </a:rPr>
+              <a:t>Deploy models</a:t>
+            </a:r>
+          </a:p>
+        </p:txBody>
+      </p:sp>
+      <p:cxnSp>
+        <p:nvCxnSpPr>
+          <p:cNvPr id="145" name="Straight Arrow Connector 144">
+            <a:extLst>
+              <a:ext uri="{FF2B5EF4-FFF2-40B4-BE49-F238E27FC236}">
+                <a16:creationId xmlns:a16="http://schemas.microsoft.com/office/drawing/2014/main" id="{501E2B31-B883-42FD-BAEB-65A8EE05AA9E}"/>
+              </a:ext>
+            </a:extLst>
+          </p:cNvPr>
+          <p:cNvCxnSpPr>
+            <a:cxnSpLocks/>
+          </p:cNvCxnSpPr>
+          <p:nvPr/>
+        </p:nvCxnSpPr>
+        <p:spPr>
+          <a:xfrm flipH="1" flipV="1">
+            <a:off x="8001303" y="2923997"/>
+            <a:ext cx="288359" cy="712685"/>
+          </a:xfrm>
+          <a:prstGeom prst="straightConnector1">
+            <a:avLst/>
+          </a:prstGeom>
+          <a:ln>
+            <a:tailEnd type="triangle"/>
+          </a:ln>
+        </p:spPr>
+        <p:style>
+          <a:lnRef idx="1">
+            <a:schemeClr val="accent1"/>
+          </a:lnRef>
+          <a:fillRef idx="0">
+            <a:schemeClr val="accent1"/>
+          </a:fillRef>
+          <a:effectRef idx="0">
+            <a:schemeClr val="accent1"/>
+          </a:effectRef>
+          <a:fontRef idx="minor">
+            <a:schemeClr val="tx1"/>
+          </a:fontRef>
+        </p:style>
+      </p:cxnSp>
+      <p:sp>
+        <p:nvSpPr>
+          <p:cNvPr id="108" name="TextBox 107">
+            <a:extLst>
+              <a:ext uri="{FF2B5EF4-FFF2-40B4-BE49-F238E27FC236}">
+                <a16:creationId xmlns:a16="http://schemas.microsoft.com/office/drawing/2014/main" id="{4C9FC578-A5D1-4719-BD04-C31111A22F5E}"/>
+              </a:ext>
+            </a:extLst>
+          </p:cNvPr>
+          <p:cNvSpPr txBox="1"/>
+          <p:nvPr/>
+        </p:nvSpPr>
+        <p:spPr>
+          <a:xfrm>
+            <a:off x="1680403" y="3792889"/>
+            <a:ext cx="992697" cy="369332"/>
+          </a:xfrm>
+          <a:prstGeom prst="rect">
+            <a:avLst/>
+          </a:prstGeom>
+        </p:spPr>
+        <p:txBody>
+          <a:bodyPr wrap="square">
+            <a:spAutoFit/>
+          </a:bodyPr>
+          <a:lstStyle>
+            <a:defPPr>
+              <a:defRPr lang="en-US"/>
+            </a:defPPr>
+            <a:lvl1pPr defTabSz="950973">
+              <a:defRPr sz="900" kern="0">
+                <a:latin typeface="Segoe UI Semibold" panose="020B0702040204020203" pitchFamily="34" charset="0"/>
+                <a:ea typeface="MS PGothic" panose="020B0600070205080204" pitchFamily="34" charset="-128"/>
+                <a:cs typeface="Segoe UI Semibold" panose="020B0702040204020203" pitchFamily="34" charset="0"/>
+              </a:defRPr>
+            </a:lvl1pPr>
+          </a:lstStyle>
+          <a:p>
+            <a:pPr algn="ctr"/>
+            <a:r>
+              <a:rPr lang="en-US" dirty="0">
+                <a:solidFill>
+                  <a:schemeClr val="tx1">
+                    <a:lumMod val="50000"/>
+                    <a:lumOff val="50000"/>
+                  </a:schemeClr>
+                </a:solidFill>
+              </a:rPr>
+              <a:t>(NOTE: not used in the lab)</a:t>
+            </a:r>
+          </a:p>
+        </p:txBody>
+      </p:sp>
+      <p:sp>
+        <p:nvSpPr>
+          <p:cNvPr id="109" name="TextBox 108">
+            <a:extLst>
+              <a:ext uri="{FF2B5EF4-FFF2-40B4-BE49-F238E27FC236}">
+                <a16:creationId xmlns:a16="http://schemas.microsoft.com/office/drawing/2014/main" id="{1542DAA2-B6F6-4853-93C8-4A0917FAE421}"/>
+              </a:ext>
+            </a:extLst>
+          </p:cNvPr>
+          <p:cNvSpPr txBox="1"/>
+          <p:nvPr/>
+        </p:nvSpPr>
+        <p:spPr>
+          <a:xfrm>
+            <a:off x="3345433" y="3782360"/>
+            <a:ext cx="2001193" cy="507831"/>
+          </a:xfrm>
+          <a:prstGeom prst="rect">
+            <a:avLst/>
+          </a:prstGeom>
+        </p:spPr>
+        <p:txBody>
+          <a:bodyPr wrap="square">
+            <a:spAutoFit/>
+          </a:bodyPr>
+          <a:lstStyle>
+            <a:defPPr>
+              <a:defRPr lang="en-US"/>
+            </a:defPPr>
+            <a:lvl1pPr defTabSz="950973">
+              <a:defRPr sz="900" kern="0">
+                <a:latin typeface="Segoe UI Semibold" panose="020B0702040204020203" pitchFamily="34" charset="0"/>
+                <a:ea typeface="MS PGothic" panose="020B0600070205080204" pitchFamily="34" charset="-128"/>
+                <a:cs typeface="Segoe UI Semibold" panose="020B0702040204020203" pitchFamily="34" charset="0"/>
+              </a:defRPr>
+            </a:lvl1pPr>
+          </a:lstStyle>
+          <a:p>
+            <a:pPr algn="ctr"/>
+            <a:r>
+              <a:rPr lang="en-US" dirty="0">
+                <a:solidFill>
+                  <a:schemeClr val="tx1">
+                    <a:lumMod val="50000"/>
+                    <a:lumOff val="50000"/>
+                  </a:schemeClr>
+                </a:solidFill>
+              </a:rPr>
+              <a:t>(NOTE: a CSV file of previously captured streaming data is provided to expedite setup) </a:t>
+            </a:r>
+          </a:p>
+        </p:txBody>
+      </p:sp>
+      <p:sp>
+        <p:nvSpPr>
+          <p:cNvPr id="115" name="TextBox 114">
+            <a:extLst>
+              <a:ext uri="{FF2B5EF4-FFF2-40B4-BE49-F238E27FC236}">
+                <a16:creationId xmlns:a16="http://schemas.microsoft.com/office/drawing/2014/main" id="{9EFFDF37-0104-41F5-A6FD-0D4D99BD8570}"/>
+              </a:ext>
+            </a:extLst>
+          </p:cNvPr>
+          <p:cNvSpPr txBox="1"/>
+          <p:nvPr/>
+        </p:nvSpPr>
+        <p:spPr>
+          <a:xfrm>
+            <a:off x="10490093" y="2722223"/>
+            <a:ext cx="1687590" cy="1615827"/>
+          </a:xfrm>
+          <a:prstGeom prst="rect">
+            <a:avLst/>
+          </a:prstGeom>
+        </p:spPr>
+        <p:txBody>
+          <a:bodyPr wrap="square">
+            <a:spAutoFit/>
+          </a:bodyPr>
+          <a:lstStyle>
+            <a:defPPr>
+              <a:defRPr lang="en-US"/>
+            </a:defPPr>
+            <a:lvl1pPr defTabSz="950973">
+              <a:defRPr sz="900" kern="0">
+                <a:latin typeface="Segoe UI Semibold" panose="020B0702040204020203" pitchFamily="34" charset="0"/>
+                <a:ea typeface="MS PGothic" panose="020B0600070205080204" pitchFamily="34" charset="-128"/>
+                <a:cs typeface="Segoe UI Semibold" panose="020B0702040204020203" pitchFamily="34" charset="0"/>
+              </a:defRPr>
+            </a:lvl1pPr>
+          </a:lstStyle>
+          <a:p>
+            <a:pPr algn="ctr"/>
+            <a:r>
+              <a:rPr lang="en-US" dirty="0">
+                <a:solidFill>
+                  <a:schemeClr val="tx1">
+                    <a:lumMod val="50000"/>
+                    <a:lumOff val="50000"/>
+                  </a:schemeClr>
+                </a:solidFill>
+              </a:rPr>
+              <a:t>(NOTE: AKS is the production-grade choice for deploying models used in real-time inferencing. To expedite setup time and optimize costs, the lab is using ACI - Azure Container Instances - for model deployment, which is only recommended for dev/test scenarios.)</a:t>
+            </a:r>
+          </a:p>
+        </p:txBody>
+      </p:sp>
+    </p:spTree>
+    <p:extLst>
+      <p:ext uri="{BB962C8B-B14F-4D97-AF65-F5344CB8AC3E}">
+        <p14:creationId xmlns:p14="http://schemas.microsoft.com/office/powerpoint/2010/main" val="4204163041"/>
+      </p:ext>
+    </p:extLst>
+  </p:cSld>
+  <p:clrMapOvr>
+    <a:masterClrMapping/>
+  </p:clrMapOvr>
+  <mc:AlternateContent xmlns:mc="http://schemas.openxmlformats.org/markup-compatibility/2006" xmlns:p14="http://schemas.microsoft.com/office/powerpoint/2010/main">
+    <mc:Choice Requires="p14">
+      <p:transition spd="med" p14:dur="700">
+        <p:fade/>
+      </p:transition>
+    </mc:Choice>
+    <mc:Fallback xmlns:a16="http://schemas.microsoft.com/office/drawing/2014/main" xmlns="">
       <p:transition spd="med">
         <p:fade/>
       </p:transition>

</xml_diff>